<commit_message>
add README and rewrite the presentation
</commit_message>
<xml_diff>
--- a/presentation.pptx
+++ b/presentation.pptx
@@ -5,7 +5,7 @@
     <p:sldMasterId id="2147483660" r:id="rId1"/>
   </p:sldMasterIdLst>
   <p:handoutMasterIdLst>
-    <p:handoutMasterId r:id="rId9"/>
+    <p:handoutMasterId r:id="rId15"/>
   </p:handoutMasterIdLst>
   <p:sldIdLst>
     <p:sldId id="256" r:id="rId2"/>
@@ -13,8 +13,14 @@
     <p:sldId id="261" r:id="rId4"/>
     <p:sldId id="262" r:id="rId5"/>
     <p:sldId id="263" r:id="rId6"/>
-    <p:sldId id="264" r:id="rId7"/>
-    <p:sldId id="265" r:id="rId8"/>
+    <p:sldId id="265" r:id="rId7"/>
+    <p:sldId id="264" r:id="rId8"/>
+    <p:sldId id="266" r:id="rId9"/>
+    <p:sldId id="267" r:id="rId10"/>
+    <p:sldId id="268" r:id="rId11"/>
+    <p:sldId id="269" r:id="rId12"/>
+    <p:sldId id="270" r:id="rId13"/>
+    <p:sldId id="271" r:id="rId14"/>
   </p:sldIdLst>
   <p:sldSz cx="9144000" cy="6858000" type="screen4x3"/>
   <p:notesSz cx="6858000" cy="9144000"/>
@@ -218,7 +224,7 @@
             <a:fld id="{BE2DD1C9-4BB6-422A-8F34-C157EA500BD9}" type="datetimeFigureOut">
               <a:rPr lang="en-US" smtClean="0"/>
               <a:pPr/>
-              <a:t>3/27/2019</a:t>
+              <a:t>5/11/2019</a:t>
             </a:fld>
             <a:endParaRPr lang="en-US"/>
           </a:p>
@@ -434,7 +440,7 @@
             <a:fld id="{1DBD9794-A4CC-42D0-9A65-24C6B9EF4076}" type="datetimeFigureOut">
               <a:rPr lang="en-US" smtClean="0"/>
               <a:pPr/>
-              <a:t>3/27/2019</a:t>
+              <a:t>5/11/2019</a:t>
             </a:fld>
             <a:endParaRPr lang="en-US"/>
           </a:p>
@@ -606,7 +612,7 @@
             <a:fld id="{1DBD9794-A4CC-42D0-9A65-24C6B9EF4076}" type="datetimeFigureOut">
               <a:rPr lang="en-US" smtClean="0"/>
               <a:pPr/>
-              <a:t>3/27/2019</a:t>
+              <a:t>5/11/2019</a:t>
             </a:fld>
             <a:endParaRPr lang="en-US"/>
           </a:p>
@@ -788,7 +794,7 @@
             <a:fld id="{1DBD9794-A4CC-42D0-9A65-24C6B9EF4076}" type="datetimeFigureOut">
               <a:rPr lang="en-US" smtClean="0"/>
               <a:pPr/>
-              <a:t>3/27/2019</a:t>
+              <a:t>5/11/2019</a:t>
             </a:fld>
             <a:endParaRPr lang="en-US"/>
           </a:p>
@@ -960,7 +966,7 @@
             <a:fld id="{1DBD9794-A4CC-42D0-9A65-24C6B9EF4076}" type="datetimeFigureOut">
               <a:rPr lang="en-US" smtClean="0"/>
               <a:pPr/>
-              <a:t>3/27/2019</a:t>
+              <a:t>5/11/2019</a:t>
             </a:fld>
             <a:endParaRPr lang="en-US"/>
           </a:p>
@@ -1206,7 +1212,7 @@
             <a:fld id="{1DBD9794-A4CC-42D0-9A65-24C6B9EF4076}" type="datetimeFigureOut">
               <a:rPr lang="en-US" smtClean="0"/>
               <a:pPr/>
-              <a:t>3/27/2019</a:t>
+              <a:t>5/11/2019</a:t>
             </a:fld>
             <a:endParaRPr lang="en-US"/>
           </a:p>
@@ -1440,7 +1446,7 @@
             <a:fld id="{1DBD9794-A4CC-42D0-9A65-24C6B9EF4076}" type="datetimeFigureOut">
               <a:rPr lang="en-US" smtClean="0"/>
               <a:pPr/>
-              <a:t>3/27/2019</a:t>
+              <a:t>5/11/2019</a:t>
             </a:fld>
             <a:endParaRPr lang="en-US"/>
           </a:p>
@@ -1809,7 +1815,7 @@
             <a:fld id="{1DBD9794-A4CC-42D0-9A65-24C6B9EF4076}" type="datetimeFigureOut">
               <a:rPr lang="en-US" smtClean="0"/>
               <a:pPr/>
-              <a:t>3/27/2019</a:t>
+              <a:t>5/11/2019</a:t>
             </a:fld>
             <a:endParaRPr lang="en-US"/>
           </a:p>
@@ -1929,7 +1935,7 @@
             <a:fld id="{1DBD9794-A4CC-42D0-9A65-24C6B9EF4076}" type="datetimeFigureOut">
               <a:rPr lang="en-US" smtClean="0"/>
               <a:pPr/>
-              <a:t>3/27/2019</a:t>
+              <a:t>5/11/2019</a:t>
             </a:fld>
             <a:endParaRPr lang="en-US"/>
           </a:p>
@@ -2026,7 +2032,7 @@
             <a:fld id="{1DBD9794-A4CC-42D0-9A65-24C6B9EF4076}" type="datetimeFigureOut">
               <a:rPr lang="en-US" smtClean="0"/>
               <a:pPr/>
-              <a:t>3/27/2019</a:t>
+              <a:t>5/11/2019</a:t>
             </a:fld>
             <a:endParaRPr lang="en-US"/>
           </a:p>
@@ -2305,7 +2311,7 @@
             <a:fld id="{1DBD9794-A4CC-42D0-9A65-24C6B9EF4076}" type="datetimeFigureOut">
               <a:rPr lang="en-US" smtClean="0"/>
               <a:pPr/>
-              <a:t>3/27/2019</a:t>
+              <a:t>5/11/2019</a:t>
             </a:fld>
             <a:endParaRPr lang="en-US"/>
           </a:p>
@@ -2564,7 +2570,7 @@
             <a:fld id="{1DBD9794-A4CC-42D0-9A65-24C6B9EF4076}" type="datetimeFigureOut">
               <a:rPr lang="en-US" smtClean="0"/>
               <a:pPr/>
-              <a:t>3/27/2019</a:t>
+              <a:t>5/11/2019</a:t>
             </a:fld>
             <a:endParaRPr lang="en-US"/>
           </a:p>
@@ -2776,7 +2782,7 @@
             <a:fld id="{1DBD9794-A4CC-42D0-9A65-24C6B9EF4076}" type="datetimeFigureOut">
               <a:rPr lang="en-US" smtClean="0"/>
               <a:pPr/>
-              <a:t>3/27/2019</a:t>
+              <a:t>5/11/2019</a:t>
             </a:fld>
             <a:endParaRPr lang="en-US"/>
           </a:p>
@@ -3314,6 +3320,1669 @@
   <p:transition>
     <p:fade/>
   </p:transition>
+  <p:timing>
+    <p:tnLst>
+      <p:par>
+        <p:cTn id="1" dur="indefinite" restart="never" nodeType="tmRoot"/>
+      </p:par>
+    </p:tnLst>
+  </p:timing>
+</p:sld>
+</file>
+
+<file path=ppt/slides/slide10.xml><?xml version="1.0" encoding="utf-8"?>
+<p:sld xmlns:a="http://schemas.openxmlformats.org/drawingml/2006/main" xmlns:r="http://schemas.openxmlformats.org/officeDocument/2006/relationships" xmlns:p="http://schemas.openxmlformats.org/presentationml/2006/main">
+  <p:cSld>
+    <p:spTree>
+      <p:nvGrpSpPr>
+        <p:cNvPr id="1" name=""/>
+        <p:cNvGrpSpPr/>
+        <p:nvPr/>
+      </p:nvGrpSpPr>
+      <p:grpSpPr>
+        <a:xfrm>
+          <a:off x="0" y="0"/>
+          <a:ext cx="0" cy="0"/>
+          <a:chOff x="0" y="0"/>
+          <a:chExt cx="0" cy="0"/>
+        </a:xfrm>
+      </p:grpSpPr>
+      <p:sp>
+        <p:nvSpPr>
+          <p:cNvPr id="2" name="Заголовок 1"/>
+          <p:cNvSpPr>
+            <a:spLocks noGrp="1"/>
+          </p:cNvSpPr>
+          <p:nvPr>
+            <p:ph type="title"/>
+          </p:nvPr>
+        </p:nvSpPr>
+        <p:spPr/>
+        <p:txBody>
+          <a:bodyPr/>
+          <a:lstStyle/>
+          <a:p>
+            <a:r>
+              <a:rPr lang="ru-RU" dirty="0" smtClean="0">
+                <a:solidFill>
+                  <a:srgbClr val="FF9900"/>
+                </a:solidFill>
+                <a:effectLst>
+                  <a:outerShdw blurRad="38100" dist="38100" dir="2700000" algn="tl">
+                    <a:srgbClr val="000000">
+                      <a:alpha val="43137"/>
+                    </a:srgbClr>
+                  </a:outerShdw>
+                </a:effectLst>
+              </a:rPr>
+              <a:t>Игра. </a:t>
+            </a:r>
+            <a:r>
+              <a:rPr lang="en-US" dirty="0" smtClean="0">
+                <a:solidFill>
+                  <a:srgbClr val="FF9900"/>
+                </a:solidFill>
+                <a:effectLst>
+                  <a:outerShdw blurRad="38100" dist="38100" dir="2700000" algn="tl">
+                    <a:srgbClr val="000000">
+                      <a:alpha val="43137"/>
+                    </a:srgbClr>
+                  </a:outerShdw>
+                </a:effectLst>
+              </a:rPr>
+              <a:t>Game.py</a:t>
+            </a:r>
+            <a:endParaRPr lang="ru-RU" dirty="0">
+              <a:solidFill>
+                <a:srgbClr val="FF9900"/>
+              </a:solidFill>
+              <a:effectLst>
+                <a:outerShdw blurRad="38100" dist="38100" dir="2700000" algn="tl">
+                  <a:srgbClr val="000000">
+                    <a:alpha val="43137"/>
+                  </a:srgbClr>
+                </a:outerShdw>
+              </a:effectLst>
+            </a:endParaRPr>
+          </a:p>
+        </p:txBody>
+      </p:sp>
+      <p:sp>
+        <p:nvSpPr>
+          <p:cNvPr id="3" name="Объект 2"/>
+          <p:cNvSpPr>
+            <a:spLocks noGrp="1"/>
+          </p:cNvSpPr>
+          <p:nvPr>
+            <p:ph idx="1"/>
+          </p:nvPr>
+        </p:nvSpPr>
+        <p:spPr/>
+        <p:txBody>
+          <a:bodyPr/>
+          <a:lstStyle/>
+          <a:p>
+            <a:pPr marL="0" indent="0">
+              <a:buNone/>
+            </a:pPr>
+            <a:r>
+              <a:rPr lang="en-US" dirty="0" smtClean="0"/>
+              <a:t>Game.py – </a:t>
+            </a:r>
+            <a:r>
+              <a:rPr lang="ru-RU" dirty="0" smtClean="0"/>
+              <a:t>основной файл, содержащий всю (или почти всю) логику игры. Осуществлён в виде класса</a:t>
+            </a:r>
+            <a:r>
+              <a:rPr lang="en-US" dirty="0" smtClean="0"/>
+              <a:t> (Game)</a:t>
+            </a:r>
+            <a:r>
+              <a:rPr lang="ru-RU" dirty="0" smtClean="0"/>
+              <a:t>.</a:t>
+            </a:r>
+            <a:endParaRPr lang="ru-RU" dirty="0"/>
+          </a:p>
+        </p:txBody>
+      </p:sp>
+    </p:spTree>
+    <p:extLst>
+      <p:ext uri="{BB962C8B-B14F-4D97-AF65-F5344CB8AC3E}">
+        <p14:creationId xmlns:p14="http://schemas.microsoft.com/office/powerpoint/2010/main" val="2719700267"/>
+      </p:ext>
+    </p:extLst>
+  </p:cSld>
+  <p:clrMapOvr>
+    <a:masterClrMapping/>
+  </p:clrMapOvr>
+  <p:timing>
+    <p:tnLst>
+      <p:par>
+        <p:cTn id="1" dur="indefinite" restart="never" nodeType="tmRoot"/>
+      </p:par>
+    </p:tnLst>
+  </p:timing>
+</p:sld>
+</file>
+
+<file path=ppt/slides/slide11.xml><?xml version="1.0" encoding="utf-8"?>
+<p:sld xmlns:a="http://schemas.openxmlformats.org/drawingml/2006/main" xmlns:r="http://schemas.openxmlformats.org/officeDocument/2006/relationships" xmlns:p="http://schemas.openxmlformats.org/presentationml/2006/main">
+  <p:cSld>
+    <p:spTree>
+      <p:nvGrpSpPr>
+        <p:cNvPr id="1" name=""/>
+        <p:cNvGrpSpPr/>
+        <p:nvPr/>
+      </p:nvGrpSpPr>
+      <p:grpSpPr>
+        <a:xfrm>
+          <a:off x="0" y="0"/>
+          <a:ext cx="0" cy="0"/>
+          <a:chOff x="0" y="0"/>
+          <a:chExt cx="0" cy="0"/>
+        </a:xfrm>
+      </p:grpSpPr>
+      <p:sp>
+        <p:nvSpPr>
+          <p:cNvPr id="2" name="Заголовок 1"/>
+          <p:cNvSpPr>
+            <a:spLocks noGrp="1"/>
+          </p:cNvSpPr>
+          <p:nvPr>
+            <p:ph type="title"/>
+          </p:nvPr>
+        </p:nvSpPr>
+        <p:spPr/>
+        <p:txBody>
+          <a:bodyPr/>
+          <a:lstStyle/>
+          <a:p>
+            <a:r>
+              <a:rPr lang="ru-RU" dirty="0" smtClean="0">
+                <a:solidFill>
+                  <a:srgbClr val="FF9900"/>
+                </a:solidFill>
+                <a:effectLst>
+                  <a:outerShdw blurRad="38100" dist="38100" dir="2700000" algn="tl">
+                    <a:srgbClr val="000000">
+                      <a:alpha val="43137"/>
+                    </a:srgbClr>
+                  </a:outerShdw>
+                </a:effectLst>
+              </a:rPr>
+              <a:t>Главный файл. </a:t>
+            </a:r>
+            <a:r>
+              <a:rPr lang="en-US" dirty="0" smtClean="0">
+                <a:solidFill>
+                  <a:srgbClr val="FF9900"/>
+                </a:solidFill>
+                <a:effectLst>
+                  <a:outerShdw blurRad="38100" dist="38100" dir="2700000" algn="tl">
+                    <a:srgbClr val="000000">
+                      <a:alpha val="43137"/>
+                    </a:srgbClr>
+                  </a:outerShdw>
+                </a:effectLst>
+              </a:rPr>
+              <a:t>Main.py</a:t>
+            </a:r>
+            <a:endParaRPr lang="ru-RU" dirty="0">
+              <a:solidFill>
+                <a:srgbClr val="FF9900"/>
+              </a:solidFill>
+              <a:effectLst>
+                <a:outerShdw blurRad="38100" dist="38100" dir="2700000" algn="tl">
+                  <a:srgbClr val="000000">
+                    <a:alpha val="43137"/>
+                  </a:srgbClr>
+                </a:outerShdw>
+              </a:effectLst>
+            </a:endParaRPr>
+          </a:p>
+        </p:txBody>
+      </p:sp>
+      <p:sp>
+        <p:nvSpPr>
+          <p:cNvPr id="3" name="Объект 2"/>
+          <p:cNvSpPr>
+            <a:spLocks noGrp="1"/>
+          </p:cNvSpPr>
+          <p:nvPr>
+            <p:ph idx="1"/>
+          </p:nvPr>
+        </p:nvSpPr>
+        <p:spPr>
+          <a:xfrm>
+            <a:off x="645459" y="1465729"/>
+            <a:ext cx="7869891" cy="4794394"/>
+          </a:xfrm>
+        </p:spPr>
+        <p:txBody>
+          <a:bodyPr/>
+          <a:lstStyle/>
+          <a:p>
+            <a:pPr marL="0" indent="0">
+              <a:buNone/>
+            </a:pPr>
+            <a:r>
+              <a:rPr lang="en-US" dirty="0" smtClean="0"/>
+              <a:t>Main.py – </a:t>
+            </a:r>
+            <a:r>
+              <a:rPr lang="ru-RU" dirty="0" smtClean="0"/>
+              <a:t>главный собирающий класс, который объединяет почти все остальные файлы.</a:t>
+            </a:r>
+          </a:p>
+          <a:p>
+            <a:pPr marL="0" indent="0">
+              <a:buNone/>
+            </a:pPr>
+            <a:r>
+              <a:rPr lang="ru-RU" dirty="0" smtClean="0"/>
+              <a:t>На следующем слайде изображена общая схема, по которой работает данный проект.</a:t>
+            </a:r>
+            <a:endParaRPr lang="ru-RU" dirty="0"/>
+          </a:p>
+        </p:txBody>
+      </p:sp>
+    </p:spTree>
+    <p:extLst>
+      <p:ext uri="{BB962C8B-B14F-4D97-AF65-F5344CB8AC3E}">
+        <p14:creationId xmlns:p14="http://schemas.microsoft.com/office/powerpoint/2010/main" val="955132052"/>
+      </p:ext>
+    </p:extLst>
+  </p:cSld>
+  <p:clrMapOvr>
+    <a:masterClrMapping/>
+  </p:clrMapOvr>
+  <p:timing>
+    <p:tnLst>
+      <p:par>
+        <p:cTn id="1" dur="indefinite" restart="never" nodeType="tmRoot"/>
+      </p:par>
+    </p:tnLst>
+  </p:timing>
+</p:sld>
+</file>
+
+<file path=ppt/slides/slide12.xml><?xml version="1.0" encoding="utf-8"?>
+<p:sld xmlns:a="http://schemas.openxmlformats.org/drawingml/2006/main" xmlns:r="http://schemas.openxmlformats.org/officeDocument/2006/relationships" xmlns:p="http://schemas.openxmlformats.org/presentationml/2006/main">
+  <p:cSld>
+    <p:spTree>
+      <p:nvGrpSpPr>
+        <p:cNvPr id="1" name=""/>
+        <p:cNvGrpSpPr/>
+        <p:nvPr/>
+      </p:nvGrpSpPr>
+      <p:grpSpPr>
+        <a:xfrm>
+          <a:off x="0" y="0"/>
+          <a:ext cx="0" cy="0"/>
+          <a:chOff x="0" y="0"/>
+          <a:chExt cx="0" cy="0"/>
+        </a:xfrm>
+      </p:grpSpPr>
+      <p:sp>
+        <p:nvSpPr>
+          <p:cNvPr id="28" name="Прямоугольник 27"/>
+          <p:cNvSpPr/>
+          <p:nvPr/>
+        </p:nvSpPr>
+        <p:spPr>
+          <a:xfrm>
+            <a:off x="4437035" y="262045"/>
+            <a:ext cx="4469130" cy="1787939"/>
+          </a:xfrm>
+          <a:prstGeom prst="rect">
+            <a:avLst/>
+          </a:prstGeom>
+        </p:spPr>
+        <p:style>
+          <a:lnRef idx="2">
+            <a:schemeClr val="accent1">
+              <a:shade val="50000"/>
+            </a:schemeClr>
+          </a:lnRef>
+          <a:fillRef idx="1">
+            <a:schemeClr val="accent1"/>
+          </a:fillRef>
+          <a:effectRef idx="0">
+            <a:schemeClr val="accent1"/>
+          </a:effectRef>
+          <a:fontRef idx="minor">
+            <a:schemeClr val="lt1"/>
+          </a:fontRef>
+        </p:style>
+        <p:txBody>
+          <a:bodyPr rtlCol="0" anchor="ctr"/>
+          <a:lstStyle/>
+          <a:p>
+            <a:pPr algn="ctr"/>
+            <a:endParaRPr lang="ru-RU">
+              <a:solidFill>
+                <a:srgbClr val="FF9900"/>
+              </a:solidFill>
+            </a:endParaRPr>
+          </a:p>
+        </p:txBody>
+      </p:sp>
+      <p:sp>
+        <p:nvSpPr>
+          <p:cNvPr id="4" name="Прямоугольник 3"/>
+          <p:cNvSpPr/>
+          <p:nvPr/>
+        </p:nvSpPr>
+        <p:spPr>
+          <a:xfrm>
+            <a:off x="1198929" y="989779"/>
+            <a:ext cx="1828800" cy="928468"/>
+          </a:xfrm>
+          <a:prstGeom prst="rect">
+            <a:avLst/>
+          </a:prstGeom>
+        </p:spPr>
+        <p:style>
+          <a:lnRef idx="2">
+            <a:schemeClr val="accent1">
+              <a:shade val="50000"/>
+            </a:schemeClr>
+          </a:lnRef>
+          <a:fillRef idx="1">
+            <a:schemeClr val="accent1"/>
+          </a:fillRef>
+          <a:effectRef idx="0">
+            <a:schemeClr val="accent1"/>
+          </a:effectRef>
+          <a:fontRef idx="minor">
+            <a:schemeClr val="lt1"/>
+          </a:fontRef>
+        </p:style>
+        <p:txBody>
+          <a:bodyPr rtlCol="0" anchor="ctr"/>
+          <a:lstStyle/>
+          <a:p>
+            <a:pPr algn="ctr"/>
+            <a:r>
+              <a:rPr lang="en-US" dirty="0" smtClean="0"/>
+              <a:t>Main.py</a:t>
+            </a:r>
+            <a:endParaRPr lang="ru-RU" dirty="0"/>
+          </a:p>
+        </p:txBody>
+      </p:sp>
+      <p:sp>
+        <p:nvSpPr>
+          <p:cNvPr id="5" name="Прямоугольник 4"/>
+          <p:cNvSpPr/>
+          <p:nvPr/>
+        </p:nvSpPr>
+        <p:spPr>
+          <a:xfrm>
+            <a:off x="3171248" y="2835792"/>
+            <a:ext cx="1730327" cy="815926"/>
+          </a:xfrm>
+          <a:prstGeom prst="rect">
+            <a:avLst/>
+          </a:prstGeom>
+        </p:spPr>
+        <p:style>
+          <a:lnRef idx="2">
+            <a:schemeClr val="accent1">
+              <a:shade val="50000"/>
+            </a:schemeClr>
+          </a:lnRef>
+          <a:fillRef idx="1">
+            <a:schemeClr val="accent1"/>
+          </a:fillRef>
+          <a:effectRef idx="0">
+            <a:schemeClr val="accent1"/>
+          </a:effectRef>
+          <a:fontRef idx="minor">
+            <a:schemeClr val="lt1"/>
+          </a:fontRef>
+        </p:style>
+        <p:txBody>
+          <a:bodyPr rtlCol="0" anchor="ctr"/>
+          <a:lstStyle/>
+          <a:p>
+            <a:pPr algn="ctr"/>
+            <a:r>
+              <a:rPr lang="en-US" dirty="0" smtClean="0"/>
+              <a:t>Game.py</a:t>
+            </a:r>
+            <a:endParaRPr lang="ru-RU" dirty="0"/>
+          </a:p>
+        </p:txBody>
+      </p:sp>
+      <p:sp>
+        <p:nvSpPr>
+          <p:cNvPr id="6" name="Прямоугольник 5"/>
+          <p:cNvSpPr/>
+          <p:nvPr/>
+        </p:nvSpPr>
+        <p:spPr>
+          <a:xfrm>
+            <a:off x="6400355" y="1211177"/>
+            <a:ext cx="2132206" cy="613682"/>
+          </a:xfrm>
+          <a:prstGeom prst="rect">
+            <a:avLst/>
+          </a:prstGeom>
+        </p:spPr>
+        <p:style>
+          <a:lnRef idx="2">
+            <a:schemeClr val="dk1">
+              <a:shade val="50000"/>
+            </a:schemeClr>
+          </a:lnRef>
+          <a:fillRef idx="1">
+            <a:schemeClr val="dk1"/>
+          </a:fillRef>
+          <a:effectRef idx="0">
+            <a:schemeClr val="dk1"/>
+          </a:effectRef>
+          <a:fontRef idx="minor">
+            <a:schemeClr val="lt1"/>
+          </a:fontRef>
+        </p:style>
+        <p:txBody>
+          <a:bodyPr rtlCol="0" anchor="ctr"/>
+          <a:lstStyle/>
+          <a:p>
+            <a:pPr algn="ctr"/>
+            <a:r>
+              <a:rPr lang="en-US" dirty="0" smtClean="0"/>
+              <a:t>ChooseCharacter.py</a:t>
+            </a:r>
+            <a:endParaRPr lang="ru-RU" dirty="0"/>
+          </a:p>
+        </p:txBody>
+      </p:sp>
+      <p:sp>
+        <p:nvSpPr>
+          <p:cNvPr id="7" name="Прямоугольник 6"/>
+          <p:cNvSpPr/>
+          <p:nvPr/>
+        </p:nvSpPr>
+        <p:spPr>
+          <a:xfrm>
+            <a:off x="4658159" y="1191957"/>
+            <a:ext cx="1493816" cy="647198"/>
+          </a:xfrm>
+          <a:prstGeom prst="rect">
+            <a:avLst/>
+          </a:prstGeom>
+        </p:spPr>
+        <p:style>
+          <a:lnRef idx="2">
+            <a:schemeClr val="dk1">
+              <a:shade val="50000"/>
+            </a:schemeClr>
+          </a:lnRef>
+          <a:fillRef idx="1">
+            <a:schemeClr val="dk1"/>
+          </a:fillRef>
+          <a:effectRef idx="0">
+            <a:schemeClr val="dk1"/>
+          </a:effectRef>
+          <a:fontRef idx="minor">
+            <a:schemeClr val="lt1"/>
+          </a:fontRef>
+        </p:style>
+        <p:txBody>
+          <a:bodyPr rtlCol="0" anchor="ctr"/>
+          <a:lstStyle/>
+          <a:p>
+            <a:pPr algn="ctr"/>
+            <a:r>
+              <a:rPr lang="en-US" dirty="0" smtClean="0"/>
+              <a:t>MainMenu.py</a:t>
+            </a:r>
+            <a:endParaRPr lang="ru-RU" dirty="0"/>
+          </a:p>
+        </p:txBody>
+      </p:sp>
+      <p:sp>
+        <p:nvSpPr>
+          <p:cNvPr id="8" name="Прямоугольник 7"/>
+          <p:cNvSpPr/>
+          <p:nvPr/>
+        </p:nvSpPr>
+        <p:spPr>
+          <a:xfrm>
+            <a:off x="4658159" y="355805"/>
+            <a:ext cx="2211271" cy="577645"/>
+          </a:xfrm>
+          <a:prstGeom prst="rect">
+            <a:avLst/>
+          </a:prstGeom>
+        </p:spPr>
+        <p:style>
+          <a:lnRef idx="2">
+            <a:schemeClr val="dk1">
+              <a:shade val="50000"/>
+            </a:schemeClr>
+          </a:lnRef>
+          <a:fillRef idx="1">
+            <a:schemeClr val="dk1"/>
+          </a:fillRef>
+          <a:effectRef idx="0">
+            <a:schemeClr val="dk1"/>
+          </a:effectRef>
+          <a:fontRef idx="minor">
+            <a:schemeClr val="lt1"/>
+          </a:fontRef>
+        </p:style>
+        <p:txBody>
+          <a:bodyPr rtlCol="0" anchor="ctr"/>
+          <a:lstStyle/>
+          <a:p>
+            <a:pPr algn="ctr"/>
+            <a:r>
+              <a:rPr lang="en-US" dirty="0" smtClean="0"/>
+              <a:t>MoreInformation.py</a:t>
+            </a:r>
+            <a:endParaRPr lang="ru-RU" dirty="0"/>
+          </a:p>
+        </p:txBody>
+      </p:sp>
+      <p:sp>
+        <p:nvSpPr>
+          <p:cNvPr id="11" name="Прямоугольник 10"/>
+          <p:cNvSpPr/>
+          <p:nvPr/>
+        </p:nvSpPr>
+        <p:spPr>
+          <a:xfrm>
+            <a:off x="7020485" y="363539"/>
+            <a:ext cx="1574875" cy="626240"/>
+          </a:xfrm>
+          <a:prstGeom prst="rect">
+            <a:avLst/>
+          </a:prstGeom>
+        </p:spPr>
+        <p:style>
+          <a:lnRef idx="2">
+            <a:schemeClr val="dk1">
+              <a:shade val="50000"/>
+            </a:schemeClr>
+          </a:lnRef>
+          <a:fillRef idx="1">
+            <a:schemeClr val="dk1"/>
+          </a:fillRef>
+          <a:effectRef idx="0">
+            <a:schemeClr val="dk1"/>
+          </a:effectRef>
+          <a:fontRef idx="minor">
+            <a:schemeClr val="lt1"/>
+          </a:fontRef>
+        </p:style>
+        <p:txBody>
+          <a:bodyPr rtlCol="0" anchor="ctr"/>
+          <a:lstStyle/>
+          <a:p>
+            <a:pPr algn="ctr"/>
+            <a:r>
+              <a:rPr lang="en-US" dirty="0" smtClean="0"/>
+              <a:t>Greeting.py</a:t>
+            </a:r>
+            <a:endParaRPr lang="ru-RU" dirty="0"/>
+          </a:p>
+        </p:txBody>
+      </p:sp>
+      <p:sp>
+        <p:nvSpPr>
+          <p:cNvPr id="12" name="Прямоугольник 11"/>
+          <p:cNvSpPr/>
+          <p:nvPr/>
+        </p:nvSpPr>
+        <p:spPr>
+          <a:xfrm>
+            <a:off x="668783" y="5162446"/>
+            <a:ext cx="1541929" cy="1004047"/>
+          </a:xfrm>
+          <a:prstGeom prst="rect">
+            <a:avLst/>
+          </a:prstGeom>
+        </p:spPr>
+        <p:style>
+          <a:lnRef idx="2">
+            <a:schemeClr val="accent1">
+              <a:shade val="50000"/>
+            </a:schemeClr>
+          </a:lnRef>
+          <a:fillRef idx="1">
+            <a:schemeClr val="accent1"/>
+          </a:fillRef>
+          <a:effectRef idx="0">
+            <a:schemeClr val="accent1"/>
+          </a:effectRef>
+          <a:fontRef idx="minor">
+            <a:schemeClr val="lt1"/>
+          </a:fontRef>
+        </p:style>
+        <p:txBody>
+          <a:bodyPr rtlCol="0" anchor="ctr"/>
+          <a:lstStyle/>
+          <a:p>
+            <a:pPr algn="ctr"/>
+            <a:r>
+              <a:rPr lang="en-US" dirty="0" smtClean="0"/>
+              <a:t>Dialogue.py</a:t>
+            </a:r>
+            <a:endParaRPr lang="ru-RU" dirty="0"/>
+          </a:p>
+        </p:txBody>
+      </p:sp>
+      <p:sp>
+        <p:nvSpPr>
+          <p:cNvPr id="15" name="Прямоугольник 14"/>
+          <p:cNvSpPr/>
+          <p:nvPr/>
+        </p:nvSpPr>
+        <p:spPr>
+          <a:xfrm>
+            <a:off x="5264229" y="6034846"/>
+            <a:ext cx="1522829" cy="642259"/>
+          </a:xfrm>
+          <a:prstGeom prst="rect">
+            <a:avLst/>
+          </a:prstGeom>
+        </p:spPr>
+        <p:style>
+          <a:lnRef idx="2">
+            <a:schemeClr val="accent1">
+              <a:shade val="50000"/>
+            </a:schemeClr>
+          </a:lnRef>
+          <a:fillRef idx="1">
+            <a:schemeClr val="accent1"/>
+          </a:fillRef>
+          <a:effectRef idx="0">
+            <a:schemeClr val="accent1"/>
+          </a:effectRef>
+          <a:fontRef idx="minor">
+            <a:schemeClr val="lt1"/>
+          </a:fontRef>
+        </p:style>
+        <p:txBody>
+          <a:bodyPr rtlCol="0" anchor="ctr"/>
+          <a:lstStyle/>
+          <a:p>
+            <a:pPr algn="ctr"/>
+            <a:r>
+              <a:rPr lang="en-US" dirty="0" smtClean="0"/>
+              <a:t>Quest1.py</a:t>
+            </a:r>
+            <a:endParaRPr lang="ru-RU" dirty="0"/>
+          </a:p>
+        </p:txBody>
+      </p:sp>
+      <p:sp>
+        <p:nvSpPr>
+          <p:cNvPr id="16" name="Прямоугольник 15"/>
+          <p:cNvSpPr/>
+          <p:nvPr/>
+        </p:nvSpPr>
+        <p:spPr>
+          <a:xfrm>
+            <a:off x="5222850" y="5078288"/>
+            <a:ext cx="1461282" cy="726574"/>
+          </a:xfrm>
+          <a:prstGeom prst="rect">
+            <a:avLst/>
+          </a:prstGeom>
+        </p:spPr>
+        <p:style>
+          <a:lnRef idx="2">
+            <a:schemeClr val="accent1">
+              <a:shade val="50000"/>
+            </a:schemeClr>
+          </a:lnRef>
+          <a:fillRef idx="1">
+            <a:schemeClr val="accent1"/>
+          </a:fillRef>
+          <a:effectRef idx="0">
+            <a:schemeClr val="accent1"/>
+          </a:effectRef>
+          <a:fontRef idx="minor">
+            <a:schemeClr val="lt1"/>
+          </a:fontRef>
+        </p:style>
+        <p:txBody>
+          <a:bodyPr rtlCol="0" anchor="ctr"/>
+          <a:lstStyle/>
+          <a:p>
+            <a:pPr algn="ctr"/>
+            <a:r>
+              <a:rPr lang="en-US" dirty="0" smtClean="0"/>
+              <a:t>Quest2.py</a:t>
+            </a:r>
+            <a:endParaRPr lang="ru-RU" dirty="0"/>
+          </a:p>
+        </p:txBody>
+      </p:sp>
+      <p:sp>
+        <p:nvSpPr>
+          <p:cNvPr id="21" name="Прямоугольник 20"/>
+          <p:cNvSpPr/>
+          <p:nvPr/>
+        </p:nvSpPr>
+        <p:spPr>
+          <a:xfrm>
+            <a:off x="5272088" y="4055272"/>
+            <a:ext cx="1398691" cy="764509"/>
+          </a:xfrm>
+          <a:prstGeom prst="rect">
+            <a:avLst/>
+          </a:prstGeom>
+        </p:spPr>
+        <p:style>
+          <a:lnRef idx="2">
+            <a:schemeClr val="accent1">
+              <a:shade val="50000"/>
+            </a:schemeClr>
+          </a:lnRef>
+          <a:fillRef idx="1">
+            <a:schemeClr val="accent1"/>
+          </a:fillRef>
+          <a:effectRef idx="0">
+            <a:schemeClr val="accent1"/>
+          </a:effectRef>
+          <a:fontRef idx="minor">
+            <a:schemeClr val="lt1"/>
+          </a:fontRef>
+        </p:style>
+        <p:txBody>
+          <a:bodyPr rtlCol="0" anchor="ctr"/>
+          <a:lstStyle/>
+          <a:p>
+            <a:pPr algn="ctr"/>
+            <a:r>
+              <a:rPr lang="en-US" dirty="0" smtClean="0"/>
+              <a:t>Quest3.py</a:t>
+            </a:r>
+            <a:endParaRPr lang="ru-RU" dirty="0"/>
+          </a:p>
+        </p:txBody>
+      </p:sp>
+      <p:sp>
+        <p:nvSpPr>
+          <p:cNvPr id="22" name="Прямоугольник 21"/>
+          <p:cNvSpPr/>
+          <p:nvPr/>
+        </p:nvSpPr>
+        <p:spPr>
+          <a:xfrm>
+            <a:off x="7423851" y="5853953"/>
+            <a:ext cx="1541929" cy="1004047"/>
+          </a:xfrm>
+          <a:prstGeom prst="rect">
+            <a:avLst/>
+          </a:prstGeom>
+        </p:spPr>
+        <p:style>
+          <a:lnRef idx="2">
+            <a:schemeClr val="accent1">
+              <a:shade val="50000"/>
+            </a:schemeClr>
+          </a:lnRef>
+          <a:fillRef idx="1">
+            <a:schemeClr val="accent1"/>
+          </a:fillRef>
+          <a:effectRef idx="0">
+            <a:schemeClr val="accent1"/>
+          </a:effectRef>
+          <a:fontRef idx="minor">
+            <a:schemeClr val="lt1"/>
+          </a:fontRef>
+        </p:style>
+        <p:txBody>
+          <a:bodyPr rtlCol="0" anchor="ctr"/>
+          <a:lstStyle/>
+          <a:p>
+            <a:pPr algn="ctr"/>
+            <a:r>
+              <a:rPr lang="en-US" dirty="0"/>
+              <a:t>e</a:t>
+            </a:r>
+            <a:r>
+              <a:rPr lang="en-US" dirty="0" smtClean="0"/>
+              <a:t>ztext.py</a:t>
+            </a:r>
+            <a:endParaRPr lang="ru-RU" dirty="0"/>
+          </a:p>
+        </p:txBody>
+      </p:sp>
+      <p:sp>
+        <p:nvSpPr>
+          <p:cNvPr id="24" name="Прямоугольник 23"/>
+          <p:cNvSpPr/>
+          <p:nvPr/>
+        </p:nvSpPr>
+        <p:spPr>
+          <a:xfrm>
+            <a:off x="417379" y="3498379"/>
+            <a:ext cx="1567431" cy="730721"/>
+          </a:xfrm>
+          <a:prstGeom prst="rect">
+            <a:avLst/>
+          </a:prstGeom>
+        </p:spPr>
+        <p:style>
+          <a:lnRef idx="2">
+            <a:schemeClr val="accent1">
+              <a:shade val="50000"/>
+            </a:schemeClr>
+          </a:lnRef>
+          <a:fillRef idx="1">
+            <a:schemeClr val="accent1"/>
+          </a:fillRef>
+          <a:effectRef idx="0">
+            <a:schemeClr val="accent1"/>
+          </a:effectRef>
+          <a:fontRef idx="minor">
+            <a:schemeClr val="lt1"/>
+          </a:fontRef>
+        </p:style>
+        <p:txBody>
+          <a:bodyPr rtlCol="0" anchor="ctr"/>
+          <a:lstStyle/>
+          <a:p>
+            <a:pPr algn="ctr"/>
+            <a:r>
+              <a:rPr lang="en-US" dirty="0" smtClean="0"/>
+              <a:t>Egg.py</a:t>
+            </a:r>
+            <a:endParaRPr lang="ru-RU" dirty="0"/>
+          </a:p>
+        </p:txBody>
+      </p:sp>
+      <p:sp>
+        <p:nvSpPr>
+          <p:cNvPr id="25" name="Прямоугольник 24"/>
+          <p:cNvSpPr/>
+          <p:nvPr/>
+        </p:nvSpPr>
+        <p:spPr>
+          <a:xfrm>
+            <a:off x="3268834" y="6084681"/>
+            <a:ext cx="1535154" cy="714640"/>
+          </a:xfrm>
+          <a:prstGeom prst="rect">
+            <a:avLst/>
+          </a:prstGeom>
+        </p:spPr>
+        <p:style>
+          <a:lnRef idx="2">
+            <a:schemeClr val="accent1">
+              <a:shade val="50000"/>
+            </a:schemeClr>
+          </a:lnRef>
+          <a:fillRef idx="1">
+            <a:schemeClr val="accent1"/>
+          </a:fillRef>
+          <a:effectRef idx="0">
+            <a:schemeClr val="accent1"/>
+          </a:effectRef>
+          <a:fontRef idx="minor">
+            <a:schemeClr val="lt1"/>
+          </a:fontRef>
+        </p:style>
+        <p:txBody>
+          <a:bodyPr rtlCol="0" anchor="ctr"/>
+          <a:lstStyle/>
+          <a:p>
+            <a:pPr algn="ctr"/>
+            <a:r>
+              <a:rPr lang="en-US" dirty="0" smtClean="0"/>
+              <a:t>Pause.py</a:t>
+            </a:r>
+            <a:endParaRPr lang="ru-RU" dirty="0"/>
+          </a:p>
+        </p:txBody>
+      </p:sp>
+      <p:sp>
+        <p:nvSpPr>
+          <p:cNvPr id="26" name="Прямоугольник 25"/>
+          <p:cNvSpPr/>
+          <p:nvPr/>
+        </p:nvSpPr>
+        <p:spPr>
+          <a:xfrm>
+            <a:off x="2267690" y="4680261"/>
+            <a:ext cx="1708924" cy="733197"/>
+          </a:xfrm>
+          <a:prstGeom prst="rect">
+            <a:avLst/>
+          </a:prstGeom>
+        </p:spPr>
+        <p:style>
+          <a:lnRef idx="2">
+            <a:schemeClr val="accent1">
+              <a:shade val="50000"/>
+            </a:schemeClr>
+          </a:lnRef>
+          <a:fillRef idx="1">
+            <a:schemeClr val="accent1"/>
+          </a:fillRef>
+          <a:effectRef idx="0">
+            <a:schemeClr val="accent1"/>
+          </a:effectRef>
+          <a:fontRef idx="minor">
+            <a:schemeClr val="lt1"/>
+          </a:fontRef>
+        </p:style>
+        <p:txBody>
+          <a:bodyPr rtlCol="0" anchor="ctr"/>
+          <a:lstStyle/>
+          <a:p>
+            <a:pPr algn="ctr"/>
+            <a:r>
+              <a:rPr lang="en-US" dirty="0" smtClean="0"/>
+              <a:t>create_field.py</a:t>
+            </a:r>
+            <a:endParaRPr lang="ru-RU" dirty="0"/>
+          </a:p>
+        </p:txBody>
+      </p:sp>
+      <p:cxnSp>
+        <p:nvCxnSpPr>
+          <p:cNvPr id="69" name="Соединительная линия уступом 68"/>
+          <p:cNvCxnSpPr>
+            <a:stCxn id="22" idx="1"/>
+            <a:endCxn id="15" idx="3"/>
+          </p:cNvCxnSpPr>
+          <p:nvPr/>
+        </p:nvCxnSpPr>
+        <p:spPr>
+          <a:xfrm rot="10800000">
+            <a:off x="6787059" y="6355977"/>
+            <a:ext cx="636793" cy="1"/>
+          </a:xfrm>
+          <a:prstGeom prst="bentConnector3">
+            <a:avLst/>
+          </a:prstGeom>
+          <a:ln>
+            <a:tailEnd type="triangle"/>
+          </a:ln>
+        </p:spPr>
+        <p:style>
+          <a:lnRef idx="1">
+            <a:schemeClr val="dk1"/>
+          </a:lnRef>
+          <a:fillRef idx="0">
+            <a:schemeClr val="dk1"/>
+          </a:fillRef>
+          <a:effectRef idx="0">
+            <a:schemeClr val="dk1"/>
+          </a:effectRef>
+          <a:fontRef idx="minor">
+            <a:schemeClr val="tx1"/>
+          </a:fontRef>
+        </p:style>
+      </p:cxnSp>
+      <p:cxnSp>
+        <p:nvCxnSpPr>
+          <p:cNvPr id="70" name="Соединительная линия уступом 69"/>
+          <p:cNvCxnSpPr>
+            <a:stCxn id="22" idx="0"/>
+            <a:endCxn id="6" idx="2"/>
+          </p:cNvCxnSpPr>
+          <p:nvPr/>
+        </p:nvCxnSpPr>
+        <p:spPr>
+          <a:xfrm rot="16200000" flipV="1">
+            <a:off x="5816090" y="3475227"/>
+            <a:ext cx="4029094" cy="728358"/>
+          </a:xfrm>
+          <a:prstGeom prst="bentConnector3">
+            <a:avLst/>
+          </a:prstGeom>
+          <a:ln>
+            <a:tailEnd type="triangle"/>
+          </a:ln>
+        </p:spPr>
+        <p:style>
+          <a:lnRef idx="1">
+            <a:schemeClr val="dk1"/>
+          </a:lnRef>
+          <a:fillRef idx="0">
+            <a:schemeClr val="dk1"/>
+          </a:fillRef>
+          <a:effectRef idx="0">
+            <a:schemeClr val="dk1"/>
+          </a:effectRef>
+          <a:fontRef idx="minor">
+            <a:schemeClr val="tx1"/>
+          </a:fontRef>
+        </p:style>
+      </p:cxnSp>
+      <p:cxnSp>
+        <p:nvCxnSpPr>
+          <p:cNvPr id="78" name="Соединительная линия уступом 77"/>
+          <p:cNvCxnSpPr>
+            <a:stCxn id="22" idx="1"/>
+            <a:endCxn id="16" idx="3"/>
+          </p:cNvCxnSpPr>
+          <p:nvPr/>
+        </p:nvCxnSpPr>
+        <p:spPr>
+          <a:xfrm rot="10800000">
+            <a:off x="6684133" y="5441575"/>
+            <a:ext cx="739719" cy="914402"/>
+          </a:xfrm>
+          <a:prstGeom prst="bentConnector3">
+            <a:avLst/>
+          </a:prstGeom>
+          <a:ln>
+            <a:tailEnd type="triangle"/>
+          </a:ln>
+        </p:spPr>
+        <p:style>
+          <a:lnRef idx="1">
+            <a:schemeClr val="dk1"/>
+          </a:lnRef>
+          <a:fillRef idx="0">
+            <a:schemeClr val="dk1"/>
+          </a:fillRef>
+          <a:effectRef idx="0">
+            <a:schemeClr val="dk1"/>
+          </a:effectRef>
+          <a:fontRef idx="minor">
+            <a:schemeClr val="tx1"/>
+          </a:fontRef>
+        </p:style>
+      </p:cxnSp>
+      <p:cxnSp>
+        <p:nvCxnSpPr>
+          <p:cNvPr id="81" name="Соединительная линия уступом 80"/>
+          <p:cNvCxnSpPr>
+            <a:stCxn id="22" idx="1"/>
+            <a:endCxn id="21" idx="3"/>
+          </p:cNvCxnSpPr>
+          <p:nvPr/>
+        </p:nvCxnSpPr>
+        <p:spPr>
+          <a:xfrm rot="10800000">
+            <a:off x="6670779" y="4437527"/>
+            <a:ext cx="753072" cy="1918450"/>
+          </a:xfrm>
+          <a:prstGeom prst="bentConnector3">
+            <a:avLst>
+              <a:gd name="adj1" fmla="val 50000"/>
+            </a:avLst>
+          </a:prstGeom>
+          <a:ln>
+            <a:tailEnd type="triangle"/>
+          </a:ln>
+        </p:spPr>
+        <p:style>
+          <a:lnRef idx="1">
+            <a:schemeClr val="dk1"/>
+          </a:lnRef>
+          <a:fillRef idx="0">
+            <a:schemeClr val="dk1"/>
+          </a:fillRef>
+          <a:effectRef idx="0">
+            <a:schemeClr val="dk1"/>
+          </a:effectRef>
+          <a:fontRef idx="minor">
+            <a:schemeClr val="tx1"/>
+          </a:fontRef>
+        </p:style>
+      </p:cxnSp>
+      <p:cxnSp>
+        <p:nvCxnSpPr>
+          <p:cNvPr id="87" name="Соединительная линия уступом 86"/>
+          <p:cNvCxnSpPr>
+            <a:stCxn id="28" idx="1"/>
+            <a:endCxn id="4" idx="3"/>
+          </p:cNvCxnSpPr>
+          <p:nvPr/>
+        </p:nvCxnSpPr>
+        <p:spPr>
+          <a:xfrm rot="10800000" flipV="1">
+            <a:off x="3027729" y="1156015"/>
+            <a:ext cx="1409306" cy="297998"/>
+          </a:xfrm>
+          <a:prstGeom prst="bentConnector3">
+            <a:avLst>
+              <a:gd name="adj1" fmla="val 50000"/>
+            </a:avLst>
+          </a:prstGeom>
+          <a:ln>
+            <a:tailEnd type="triangle"/>
+          </a:ln>
+        </p:spPr>
+        <p:style>
+          <a:lnRef idx="1">
+            <a:schemeClr val="dk1"/>
+          </a:lnRef>
+          <a:fillRef idx="0">
+            <a:schemeClr val="dk1"/>
+          </a:fillRef>
+          <a:effectRef idx="0">
+            <a:schemeClr val="dk1"/>
+          </a:effectRef>
+          <a:fontRef idx="minor">
+            <a:schemeClr val="tx1"/>
+          </a:fontRef>
+        </p:style>
+      </p:cxnSp>
+      <p:cxnSp>
+        <p:nvCxnSpPr>
+          <p:cNvPr id="90" name="Соединительная линия уступом 89"/>
+          <p:cNvCxnSpPr>
+            <a:stCxn id="5" idx="0"/>
+            <a:endCxn id="4" idx="2"/>
+          </p:cNvCxnSpPr>
+          <p:nvPr/>
+        </p:nvCxnSpPr>
+        <p:spPr>
+          <a:xfrm rot="16200000" flipV="1">
+            <a:off x="2616099" y="1415478"/>
+            <a:ext cx="917545" cy="1923083"/>
+          </a:xfrm>
+          <a:prstGeom prst="bentConnector3">
+            <a:avLst>
+              <a:gd name="adj1" fmla="val 50000"/>
+            </a:avLst>
+          </a:prstGeom>
+          <a:ln>
+            <a:tailEnd type="triangle"/>
+          </a:ln>
+        </p:spPr>
+        <p:style>
+          <a:lnRef idx="1">
+            <a:schemeClr val="dk1"/>
+          </a:lnRef>
+          <a:fillRef idx="0">
+            <a:schemeClr val="dk1"/>
+          </a:fillRef>
+          <a:effectRef idx="0">
+            <a:schemeClr val="dk1"/>
+          </a:effectRef>
+          <a:fontRef idx="minor">
+            <a:schemeClr val="tx1"/>
+          </a:fontRef>
+        </p:style>
+      </p:cxnSp>
+      <p:cxnSp>
+        <p:nvCxnSpPr>
+          <p:cNvPr id="93" name="Соединительная линия уступом 92"/>
+          <p:cNvCxnSpPr>
+            <a:stCxn id="24" idx="0"/>
+            <a:endCxn id="5" idx="2"/>
+          </p:cNvCxnSpPr>
+          <p:nvPr/>
+        </p:nvCxnSpPr>
+        <p:spPr>
+          <a:xfrm rot="16200000" flipH="1">
+            <a:off x="2542083" y="2157390"/>
+            <a:ext cx="153339" cy="2835317"/>
+          </a:xfrm>
+          <a:prstGeom prst="bentConnector5">
+            <a:avLst>
+              <a:gd name="adj1" fmla="val -149081"/>
+              <a:gd name="adj2" fmla="val 48564"/>
+              <a:gd name="adj3" fmla="val 249081"/>
+            </a:avLst>
+          </a:prstGeom>
+          <a:ln>
+            <a:tailEnd type="triangle"/>
+          </a:ln>
+        </p:spPr>
+        <p:style>
+          <a:lnRef idx="1">
+            <a:schemeClr val="dk1"/>
+          </a:lnRef>
+          <a:fillRef idx="0">
+            <a:schemeClr val="dk1"/>
+          </a:fillRef>
+          <a:effectRef idx="0">
+            <a:schemeClr val="dk1"/>
+          </a:effectRef>
+          <a:fontRef idx="minor">
+            <a:schemeClr val="tx1"/>
+          </a:fontRef>
+        </p:style>
+      </p:cxnSp>
+      <p:cxnSp>
+        <p:nvCxnSpPr>
+          <p:cNvPr id="97" name="Соединительная линия уступом 96"/>
+          <p:cNvCxnSpPr>
+            <a:stCxn id="26" idx="0"/>
+            <a:endCxn id="5" idx="2"/>
+          </p:cNvCxnSpPr>
+          <p:nvPr/>
+        </p:nvCxnSpPr>
+        <p:spPr>
+          <a:xfrm rot="5400000" flipH="1" flipV="1">
+            <a:off x="3065011" y="3708860"/>
+            <a:ext cx="1028543" cy="914260"/>
+          </a:xfrm>
+          <a:prstGeom prst="bentConnector3">
+            <a:avLst>
+              <a:gd name="adj1" fmla="val 50000"/>
+            </a:avLst>
+          </a:prstGeom>
+          <a:ln>
+            <a:tailEnd type="triangle"/>
+          </a:ln>
+        </p:spPr>
+        <p:style>
+          <a:lnRef idx="1">
+            <a:schemeClr val="dk1"/>
+          </a:lnRef>
+          <a:fillRef idx="0">
+            <a:schemeClr val="dk1"/>
+          </a:fillRef>
+          <a:effectRef idx="0">
+            <a:schemeClr val="dk1"/>
+          </a:effectRef>
+          <a:fontRef idx="minor">
+            <a:schemeClr val="tx1"/>
+          </a:fontRef>
+        </p:style>
+      </p:cxnSp>
+      <p:cxnSp>
+        <p:nvCxnSpPr>
+          <p:cNvPr id="101" name="Соединительная линия уступом 100"/>
+          <p:cNvCxnSpPr>
+            <a:stCxn id="21" idx="0"/>
+            <a:endCxn id="5" idx="2"/>
+          </p:cNvCxnSpPr>
+          <p:nvPr/>
+        </p:nvCxnSpPr>
+        <p:spPr>
+          <a:xfrm rot="16200000" flipV="1">
+            <a:off x="4802146" y="2885984"/>
+            <a:ext cx="403554" cy="1935022"/>
+          </a:xfrm>
+          <a:prstGeom prst="bentConnector3">
+            <a:avLst>
+              <a:gd name="adj1" fmla="val 41503"/>
+            </a:avLst>
+          </a:prstGeom>
+          <a:ln>
+            <a:tailEnd type="triangle"/>
+          </a:ln>
+        </p:spPr>
+        <p:style>
+          <a:lnRef idx="1">
+            <a:schemeClr val="dk1"/>
+          </a:lnRef>
+          <a:fillRef idx="0">
+            <a:schemeClr val="dk1"/>
+          </a:fillRef>
+          <a:effectRef idx="0">
+            <a:schemeClr val="dk1"/>
+          </a:effectRef>
+          <a:fontRef idx="minor">
+            <a:schemeClr val="tx1"/>
+          </a:fontRef>
+        </p:style>
+      </p:cxnSp>
+      <p:cxnSp>
+        <p:nvCxnSpPr>
+          <p:cNvPr id="104" name="Соединительная линия уступом 103"/>
+          <p:cNvCxnSpPr>
+            <a:stCxn id="12" idx="0"/>
+            <a:endCxn id="5" idx="2"/>
+          </p:cNvCxnSpPr>
+          <p:nvPr/>
+        </p:nvCxnSpPr>
+        <p:spPr>
+          <a:xfrm rot="5400000" flipH="1" flipV="1">
+            <a:off x="1982716" y="3108750"/>
+            <a:ext cx="1510728" cy="2596664"/>
+          </a:xfrm>
+          <a:prstGeom prst="bentConnector3">
+            <a:avLst>
+              <a:gd name="adj1" fmla="val 50000"/>
+            </a:avLst>
+          </a:prstGeom>
+          <a:ln>
+            <a:tailEnd type="triangle"/>
+          </a:ln>
+        </p:spPr>
+        <p:style>
+          <a:lnRef idx="1">
+            <a:schemeClr val="dk1"/>
+          </a:lnRef>
+          <a:fillRef idx="0">
+            <a:schemeClr val="dk1"/>
+          </a:fillRef>
+          <a:effectRef idx="0">
+            <a:schemeClr val="dk1"/>
+          </a:effectRef>
+          <a:fontRef idx="minor">
+            <a:schemeClr val="tx1"/>
+          </a:fontRef>
+        </p:style>
+      </p:cxnSp>
+      <p:cxnSp>
+        <p:nvCxnSpPr>
+          <p:cNvPr id="117" name="Соединительная линия уступом 116"/>
+          <p:cNvCxnSpPr>
+            <a:stCxn id="25" idx="0"/>
+            <a:endCxn id="5" idx="2"/>
+          </p:cNvCxnSpPr>
+          <p:nvPr/>
+        </p:nvCxnSpPr>
+        <p:spPr>
+          <a:xfrm rot="5400000" flipH="1" flipV="1">
+            <a:off x="2819930" y="4868200"/>
+            <a:ext cx="2432963" cy="1"/>
+          </a:xfrm>
+          <a:prstGeom prst="bentConnector3">
+            <a:avLst>
+              <a:gd name="adj1" fmla="val 50000"/>
+            </a:avLst>
+          </a:prstGeom>
+          <a:ln>
+            <a:tailEnd type="triangle"/>
+          </a:ln>
+        </p:spPr>
+        <p:style>
+          <a:lnRef idx="1">
+            <a:schemeClr val="dk1"/>
+          </a:lnRef>
+          <a:fillRef idx="0">
+            <a:schemeClr val="dk1"/>
+          </a:fillRef>
+          <a:effectRef idx="0">
+            <a:schemeClr val="dk1"/>
+          </a:effectRef>
+          <a:fontRef idx="minor">
+            <a:schemeClr val="tx1"/>
+          </a:fontRef>
+        </p:style>
+      </p:cxnSp>
+      <p:cxnSp>
+        <p:nvCxnSpPr>
+          <p:cNvPr id="122" name="Соединительная линия уступом 121"/>
+          <p:cNvCxnSpPr>
+            <a:stCxn id="15" idx="0"/>
+            <a:endCxn id="5" idx="2"/>
+          </p:cNvCxnSpPr>
+          <p:nvPr/>
+        </p:nvCxnSpPr>
+        <p:spPr>
+          <a:xfrm rot="16200000" flipV="1">
+            <a:off x="3839464" y="3848666"/>
+            <a:ext cx="2383128" cy="1989232"/>
+          </a:xfrm>
+          <a:prstGeom prst="bentConnector3">
+            <a:avLst>
+              <a:gd name="adj1" fmla="val 3957"/>
+            </a:avLst>
+          </a:prstGeom>
+          <a:ln>
+            <a:tailEnd type="triangle"/>
+          </a:ln>
+        </p:spPr>
+        <p:style>
+          <a:lnRef idx="1">
+            <a:schemeClr val="dk1"/>
+          </a:lnRef>
+          <a:fillRef idx="0">
+            <a:schemeClr val="dk1"/>
+          </a:fillRef>
+          <a:effectRef idx="0">
+            <a:schemeClr val="dk1"/>
+          </a:effectRef>
+          <a:fontRef idx="minor">
+            <a:schemeClr val="tx1"/>
+          </a:fontRef>
+        </p:style>
+      </p:cxnSp>
+      <p:cxnSp>
+        <p:nvCxnSpPr>
+          <p:cNvPr id="130" name="Соединительная линия уступом 129"/>
+          <p:cNvCxnSpPr>
+            <a:stCxn id="16" idx="0"/>
+            <a:endCxn id="5" idx="2"/>
+          </p:cNvCxnSpPr>
+          <p:nvPr/>
+        </p:nvCxnSpPr>
+        <p:spPr>
+          <a:xfrm rot="16200000" flipV="1">
+            <a:off x="4281667" y="3406463"/>
+            <a:ext cx="1426570" cy="1917079"/>
+          </a:xfrm>
+          <a:prstGeom prst="bentConnector3">
+            <a:avLst>
+              <a:gd name="adj1" fmla="val 10740"/>
+            </a:avLst>
+          </a:prstGeom>
+          <a:ln>
+            <a:tailEnd type="triangle"/>
+          </a:ln>
+        </p:spPr>
+        <p:style>
+          <a:lnRef idx="1">
+            <a:schemeClr val="dk1"/>
+          </a:lnRef>
+          <a:fillRef idx="0">
+            <a:schemeClr val="dk1"/>
+          </a:fillRef>
+          <a:effectRef idx="0">
+            <a:schemeClr val="dk1"/>
+          </a:effectRef>
+          <a:fontRef idx="minor">
+            <a:schemeClr val="tx1"/>
+          </a:fontRef>
+        </p:style>
+      </p:cxnSp>
+      <p:sp>
+        <p:nvSpPr>
+          <p:cNvPr id="152" name="Прямоугольник 151"/>
+          <p:cNvSpPr/>
+          <p:nvPr/>
+        </p:nvSpPr>
+        <p:spPr>
+          <a:xfrm>
+            <a:off x="196906" y="117379"/>
+            <a:ext cx="2776401" cy="646331"/>
+          </a:xfrm>
+          <a:prstGeom prst="rect">
+            <a:avLst/>
+          </a:prstGeom>
+        </p:spPr>
+        <p:txBody>
+          <a:bodyPr wrap="none">
+            <a:spAutoFit/>
+          </a:bodyPr>
+          <a:lstStyle/>
+          <a:p>
+            <a:r>
+              <a:rPr lang="ru-RU" sz="3600" dirty="0" smtClean="0">
+                <a:solidFill>
+                  <a:srgbClr val="FF9900"/>
+                </a:solidFill>
+                <a:effectLst>
+                  <a:outerShdw blurRad="38100" dist="38100" dir="2700000" algn="tl">
+                    <a:srgbClr val="000000">
+                      <a:alpha val="43137"/>
+                    </a:srgbClr>
+                  </a:outerShdw>
+                </a:effectLst>
+              </a:rPr>
+              <a:t>Общая схема</a:t>
+            </a:r>
+            <a:endParaRPr lang="ru-RU" sz="3600" dirty="0">
+              <a:solidFill>
+                <a:srgbClr val="FF9900"/>
+              </a:solidFill>
+              <a:effectLst>
+                <a:outerShdw blurRad="38100" dist="38100" dir="2700000" algn="tl">
+                  <a:srgbClr val="000000">
+                    <a:alpha val="43137"/>
+                  </a:srgbClr>
+                </a:outerShdw>
+              </a:effectLst>
+            </a:endParaRPr>
+          </a:p>
+        </p:txBody>
+      </p:sp>
+    </p:spTree>
+    <p:extLst>
+      <p:ext uri="{BB962C8B-B14F-4D97-AF65-F5344CB8AC3E}">
+        <p14:creationId xmlns:p14="http://schemas.microsoft.com/office/powerpoint/2010/main" val="3755067304"/>
+      </p:ext>
+    </p:extLst>
+  </p:cSld>
+  <p:clrMapOvr>
+    <a:masterClrMapping/>
+  </p:clrMapOvr>
+  <p:timing>
+    <p:tnLst>
+      <p:par>
+        <p:cTn id="1" dur="indefinite" restart="never" nodeType="tmRoot"/>
+      </p:par>
+    </p:tnLst>
+  </p:timing>
+</p:sld>
+</file>
+
+<file path=ppt/slides/slide13.xml><?xml version="1.0" encoding="utf-8"?>
+<p:sld xmlns:a="http://schemas.openxmlformats.org/drawingml/2006/main" xmlns:r="http://schemas.openxmlformats.org/officeDocument/2006/relationships" xmlns:p="http://schemas.openxmlformats.org/presentationml/2006/main">
+  <p:cSld>
+    <p:spTree>
+      <p:nvGrpSpPr>
+        <p:cNvPr id="1" name=""/>
+        <p:cNvGrpSpPr/>
+        <p:nvPr/>
+      </p:nvGrpSpPr>
+      <p:grpSpPr>
+        <a:xfrm>
+          <a:off x="0" y="0"/>
+          <a:ext cx="0" cy="0"/>
+          <a:chOff x="0" y="0"/>
+          <a:chExt cx="0" cy="0"/>
+        </a:xfrm>
+      </p:grpSpPr>
+      <p:sp>
+        <p:nvSpPr>
+          <p:cNvPr id="2" name="Заголовок 1"/>
+          <p:cNvSpPr>
+            <a:spLocks noGrp="1"/>
+          </p:cNvSpPr>
+          <p:nvPr>
+            <p:ph type="title"/>
+          </p:nvPr>
+        </p:nvSpPr>
+        <p:spPr/>
+        <p:txBody>
+          <a:bodyPr/>
+          <a:lstStyle/>
+          <a:p>
+            <a:r>
+              <a:rPr lang="ru-RU" dirty="0" smtClean="0">
+                <a:solidFill>
+                  <a:srgbClr val="FF9900"/>
+                </a:solidFill>
+                <a:effectLst>
+                  <a:outerShdw blurRad="38100" dist="38100" dir="2700000" algn="tl">
+                    <a:srgbClr val="000000">
+                      <a:alpha val="43137"/>
+                    </a:srgbClr>
+                  </a:outerShdw>
+                </a:effectLst>
+              </a:rPr>
+              <a:t>Дополнительная информация</a:t>
+            </a:r>
+            <a:endParaRPr lang="ru-RU" dirty="0">
+              <a:solidFill>
+                <a:srgbClr val="FF9900"/>
+              </a:solidFill>
+              <a:effectLst>
+                <a:outerShdw blurRad="38100" dist="38100" dir="2700000" algn="tl">
+                  <a:srgbClr val="000000">
+                    <a:alpha val="43137"/>
+                  </a:srgbClr>
+                </a:outerShdw>
+              </a:effectLst>
+            </a:endParaRPr>
+          </a:p>
+        </p:txBody>
+      </p:sp>
+      <p:sp>
+        <p:nvSpPr>
+          <p:cNvPr id="3" name="Объект 2"/>
+          <p:cNvSpPr>
+            <a:spLocks noGrp="1"/>
+          </p:cNvSpPr>
+          <p:nvPr>
+            <p:ph idx="1"/>
+          </p:nvPr>
+        </p:nvSpPr>
+        <p:spPr/>
+        <p:txBody>
+          <a:bodyPr/>
+          <a:lstStyle/>
+          <a:p>
+            <a:pPr marL="0" indent="0">
+              <a:buNone/>
+            </a:pPr>
+            <a:r>
+              <a:rPr lang="ru-RU" dirty="0" smtClean="0"/>
+              <a:t>В игре присутствует</a:t>
+            </a:r>
+            <a:r>
+              <a:rPr lang="en-US" dirty="0" smtClean="0"/>
+              <a:t>:</a:t>
+            </a:r>
+          </a:p>
+          <a:p>
+            <a:pPr lvl="1"/>
+            <a:r>
+              <a:rPr lang="ru-RU" dirty="0" smtClean="0"/>
+              <a:t>Три квеста</a:t>
+            </a:r>
+          </a:p>
+          <a:p>
+            <a:pPr lvl="1"/>
+            <a:r>
+              <a:rPr lang="ru-RU" dirty="0" smtClean="0"/>
+              <a:t>Шесть </a:t>
+            </a:r>
+            <a:r>
+              <a:rPr lang="ru-RU" dirty="0" err="1" smtClean="0"/>
+              <a:t>пасхалок</a:t>
+            </a:r>
+            <a:endParaRPr lang="ru-RU" dirty="0" smtClean="0"/>
+          </a:p>
+          <a:p>
+            <a:pPr lvl="1"/>
+            <a:r>
+              <a:rPr lang="ru-RU" dirty="0" smtClean="0"/>
+              <a:t>Радио, состоящее из 4 саундтреков</a:t>
+            </a:r>
+          </a:p>
+          <a:p>
+            <a:pPr lvl="1"/>
+            <a:r>
+              <a:rPr lang="ru-RU" dirty="0" smtClean="0"/>
+              <a:t>И ещё много чего интересного, с чем вы можете ознакомиться, непосредственно, пройдя игру.</a:t>
+            </a:r>
+            <a:endParaRPr lang="ru-RU" dirty="0"/>
+          </a:p>
+        </p:txBody>
+      </p:sp>
+    </p:spTree>
+    <p:extLst>
+      <p:ext uri="{BB962C8B-B14F-4D97-AF65-F5344CB8AC3E}">
+        <p14:creationId xmlns:p14="http://schemas.microsoft.com/office/powerpoint/2010/main" val="2974581170"/>
+      </p:ext>
+    </p:extLst>
+  </p:cSld>
+  <p:clrMapOvr>
+    <a:masterClrMapping/>
+  </p:clrMapOvr>
   <p:timing>
     <p:tnLst>
       <p:par>
@@ -4955,16 +6624,7 @@
                   </a:solidFill>
                   <a:hlinkClick r:id="rId7" action="ppaction://hlinksldjump"/>
                 </a:rPr>
-                <a:t>Что изменилось</a:t>
-              </a:r>
-              <a:r>
-                <a:rPr lang="en-US" sz="2000" dirty="0" smtClean="0">
-                  <a:solidFill>
-                    <a:srgbClr val="000000"/>
-                  </a:solidFill>
-                  <a:hlinkClick r:id="rId7" action="ppaction://hlinksldjump"/>
-                </a:rPr>
-                <a:t>?</a:t>
+                <a:t>Общая схема</a:t>
               </a:r>
               <a:endParaRPr lang="en-US" sz="2000" dirty="0" smtClean="0">
                 <a:solidFill>
@@ -5485,15 +7145,15 @@
               <a:r>
                 <a:rPr lang="ru-RU" sz="2000" dirty="0" smtClean="0">
                   <a:solidFill>
-                    <a:srgbClr val="000000"/>
+                    <a:srgbClr val="FF9900"/>
                   </a:solidFill>
                   <a:hlinkClick r:id="rId8" action="ppaction://hlinksldjump"/>
                 </a:rPr>
-                <a:t>В разработке</a:t>
+                <a:t>Дополнительная информация</a:t>
               </a:r>
               <a:endParaRPr lang="en-US" sz="2000" dirty="0">
                 <a:solidFill>
-                  <a:srgbClr val="000000"/>
+                  <a:srgbClr val="FF9900"/>
                 </a:solidFill>
               </a:endParaRPr>
             </a:p>
@@ -5809,7 +7469,7 @@
               <a:lstStyle/>
               <a:p>
                 <a:r>
-                  <a:rPr lang="en-US" b="1">
+                  <a:rPr lang="en-US" b="1" dirty="0">
                     <a:solidFill>
                       <a:srgbClr val="FFFFFF"/>
                     </a:solidFill>
@@ -6109,6 +7769,7 @@
           </a:bodyPr>
           <a:lstStyle/>
           <a:p>
+            <a:pPr algn="just"/>
             <a:r>
               <a:rPr lang="ru-RU" sz="2400" dirty="0" smtClean="0"/>
               <a:t>Игрок управляет персонажем, который должен выполнить все задания и найти все </a:t>
@@ -6264,6 +7925,38 @@
               </a:rPr>
               <a:t>Структура игры</a:t>
             </a:r>
+            <a:r>
+              <a:rPr lang="en-US" dirty="0" smtClean="0">
+                <a:solidFill>
+                  <a:srgbClr val="FF9900"/>
+                </a:solidFill>
+                <a:effectLst>
+                  <a:outerShdw blurRad="38100" dist="38100" dir="2700000" algn="tl">
+                    <a:srgbClr val="000000">
+                      <a:alpha val="43137"/>
+                    </a:srgbClr>
+                  </a:outerShdw>
+                </a:effectLst>
+                <a:cs typeface="Times New Roman" pitchFamily="18" charset="0"/>
+              </a:rPr>
+              <a:t>. </a:t>
+            </a:r>
+            <a:r>
+              <a:rPr lang="ru-RU" dirty="0" smtClean="0">
+                <a:solidFill>
+                  <a:srgbClr val="FF9900"/>
+                </a:solidFill>
+                <a:effectLst>
+                  <a:outerShdw blurRad="38100" dist="38100" dir="2700000" algn="tl">
+                    <a:srgbClr val="000000">
+                      <a:alpha val="43137"/>
+                    </a:srgbClr>
+                  </a:outerShdw>
+                </a:effectLst>
+                <a:cs typeface="Times New Roman" pitchFamily="18" charset="0"/>
+              </a:rPr>
+              <a:t>Карта.</a:t>
+            </a:r>
             <a:endParaRPr lang="ru-RU" dirty="0">
               <a:solidFill>
                 <a:srgbClr val="FF9900"/>
@@ -6289,7 +7982,7 @@
         <p:spPr>
           <a:xfrm>
             <a:off x="635000" y="1346200"/>
-            <a:ext cx="6578600" cy="3416320"/>
+            <a:ext cx="6578600" cy="4524315"/>
           </a:xfrm>
           <a:prstGeom prst="rect">
             <a:avLst/>
@@ -6302,70 +7995,37 @@
           </a:bodyPr>
           <a:lstStyle/>
           <a:p>
-            <a:pPr marL="342900" indent="-342900" algn="just">
-              <a:buFont typeface="Arial" panose="020B0604020202020204" pitchFamily="34" charset="0"/>
-              <a:buChar char="•"/>
-            </a:pPr>
+            <a:pPr algn="just"/>
+            <a:r>
+              <a:rPr lang="ru-RU" sz="2400" dirty="0"/>
+              <a:t>Карта представляет собой одно большое изображение(</a:t>
+            </a:r>
+            <a:r>
+              <a:rPr lang="ru-RU" sz="2400" dirty="0" err="1"/>
+              <a:t>levels</a:t>
+            </a:r>
+            <a:r>
+              <a:rPr lang="ru-RU" sz="2400" dirty="0"/>
+              <a:t>/MainLocation.png), к которому подкрепляется файл(create_field.py), содержащий двумерный массив со всеми объектами на карте. Это сделано для оптимизации игры, ведь карта довольно большая и обработать её тяжело</a:t>
+            </a:r>
             <a:r>
               <a:rPr lang="ru-RU" sz="2400" dirty="0" smtClean="0"/>
-              <a:t>Карта представляет собой одно большое изображение, к которому подкрепляется файл, содержащий двумерный массив со всеми объектами на карте. Это сделано для оптимизации игры, ведь карта довольно большая и обработать её тяжело.</a:t>
-            </a:r>
-          </a:p>
-          <a:p>
-            <a:pPr marL="342900" indent="-342900" algn="just">
-              <a:buFont typeface="Arial" panose="020B0604020202020204" pitchFamily="34" charset="0"/>
-              <a:buChar char="•"/>
-            </a:pPr>
-            <a:r>
-              <a:rPr lang="ru-RU" sz="2400" dirty="0" smtClean="0"/>
-              <a:t>Код игры распределён по разным файлам, которые подключаются к одному главному файлу.</a:t>
-            </a:r>
-          </a:p>
-        </p:txBody>
-      </p:sp>
-      <p:pic>
-        <p:nvPicPr>
-          <p:cNvPr id="5" name="Picture 2" descr="ÐÐ°ÑÑÐ¸Ð½ÐºÐ¸ Ð¿Ð¾ Ð·Ð°Ð¿ÑÐ¾ÑÑ ÐºÐ°ÑÑÐ¸Ð½ÐºÐ° Ð½Ð°Ð·Ð°Ð´ Ð² Ð±ÑÐ´ÑÑÐµÐµ">
-            <a:hlinkClick r:id="rId2" action="ppaction://hlinksldjump"/>
-          </p:cNvPr>
-          <p:cNvPicPr>
-            <a:picLocks noChangeAspect="1" noChangeArrowheads="1"/>
-          </p:cNvPicPr>
-          <p:nvPr/>
-        </p:nvPicPr>
-        <p:blipFill>
-          <a:blip r:embed="rId3" cstate="print">
-            <a:extLst>
-              <a:ext uri="{28A0092B-C50C-407E-A947-70E740481C1C}">
-                <a14:useLocalDpi xmlns:a14="http://schemas.microsoft.com/office/drawing/2010/main" val="0"/>
-              </a:ext>
-            </a:extLst>
-          </a:blip>
-          <a:srcRect/>
-          <a:stretch>
-            <a:fillRect/>
-          </a:stretch>
-        </p:blipFill>
-        <p:spPr bwMode="auto">
-          <a:xfrm>
-            <a:off x="7851775" y="2352248"/>
-            <a:ext cx="1177925" cy="1766888"/>
-          </a:xfrm>
-          <a:prstGeom prst="rect">
-            <a:avLst/>
-          </a:prstGeom>
-          <a:noFill/>
-          <a:extLst>
-            <a:ext uri="{909E8E84-426E-40DD-AFC4-6F175D3DCCD1}">
-              <a14:hiddenFill xmlns:a14="http://schemas.microsoft.com/office/drawing/2010/main">
-                <a:solidFill>
-                  <a:srgbClr val="FFFFFF"/>
-                </a:solidFill>
-              </a14:hiddenFill>
-            </a:ext>
-          </a:extLst>
-        </p:spPr>
-      </p:pic>
+              <a:t>.</a:t>
+            </a:r>
+          </a:p>
+          <a:p>
+            <a:pPr algn="just"/>
+            <a:endParaRPr lang="ru-RU" sz="2400" dirty="0"/>
+          </a:p>
+          <a:p>
+            <a:pPr algn="just"/>
+            <a:r>
+              <a:rPr lang="ru-RU" sz="2400" dirty="0"/>
+              <a:t>Код игры распределён по разным файлам(например: Game.py, Quest1.py и др.), которые подключаются к одному главному файлу.</a:t>
+            </a:r>
+          </a:p>
+        </p:txBody>
+      </p:sp>
     </p:spTree>
     <p:extLst>
       <p:ext uri="{BB962C8B-B14F-4D97-AF65-F5344CB8AC3E}">
@@ -6433,12 +8093,11 @@
                     </a:srgbClr>
                   </a:outerShdw>
                 </a:effectLst>
-                <a:cs typeface="Times New Roman" pitchFamily="18" charset="0"/>
               </a:rPr>
-              <a:t>Что изменилось</a:t>
-            </a:r>
-            <a:r>
-              <a:rPr lang="en-US" dirty="0" smtClean="0">
+              <a:t>Статичная карта. </a:t>
+            </a:r>
+            <a:r>
+              <a:rPr lang="ru-RU" dirty="0">
                 <a:solidFill>
                   <a:srgbClr val="FF9900"/>
                 </a:solidFill>
@@ -6449,187 +8108,48 @@
                     </a:srgbClr>
                   </a:outerShdw>
                 </a:effectLst>
-                <a:cs typeface="Times New Roman" pitchFamily="18" charset="0"/>
               </a:rPr>
-              <a:t>?</a:t>
-            </a:r>
-            <a:endParaRPr lang="ru-RU" dirty="0">
-              <a:solidFill>
-                <a:srgbClr val="FF9900"/>
-              </a:solidFill>
-              <a:effectLst>
-                <a:outerShdw blurRad="38100" dist="38100" dir="2700000" algn="tl">
-                  <a:srgbClr val="000000">
-                    <a:alpha val="43137"/>
-                  </a:srgbClr>
-                </a:outerShdw>
-              </a:effectLst>
-              <a:cs typeface="Times New Roman" pitchFamily="18" charset="0"/>
-            </a:endParaRPr>
-          </a:p>
-        </p:txBody>
-      </p:sp>
-      <p:sp>
-        <p:nvSpPr>
-          <p:cNvPr id="56" name="TextBox 55"/>
-          <p:cNvSpPr txBox="1"/>
-          <p:nvPr/>
-        </p:nvSpPr>
+              <a:t>MainLocation.png</a:t>
+            </a:r>
+          </a:p>
+        </p:txBody>
+      </p:sp>
+      <p:pic>
+        <p:nvPicPr>
+          <p:cNvPr id="4" name="Объект 3"/>
+          <p:cNvPicPr>
+            <a:picLocks noGrp="1" noChangeAspect="1"/>
+          </p:cNvPicPr>
+          <p:nvPr>
+            <p:ph idx="1"/>
+          </p:nvPr>
+        </p:nvPicPr>
+        <p:blipFill>
+          <a:blip r:embed="rId2"/>
+          <a:stretch>
+            <a:fillRect/>
+          </a:stretch>
+        </p:blipFill>
         <p:spPr>
           <a:xfrm>
-            <a:off x="634999" y="1346200"/>
-            <a:ext cx="7089775" cy="2677656"/>
+            <a:off x="646113" y="1495577"/>
+            <a:ext cx="7869237" cy="4651071"/>
           </a:xfrm>
           <a:prstGeom prst="rect">
             <a:avLst/>
           </a:prstGeom>
-          <a:noFill/>
-        </p:spPr>
-        <p:txBody>
-          <a:bodyPr wrap="square" rtlCol="0">
-            <a:spAutoFit/>
-          </a:bodyPr>
-          <a:lstStyle/>
-          <a:p>
-            <a:pPr marL="342900" indent="-342900" algn="just">
-              <a:buFont typeface="Wingdings" panose="05000000000000000000" pitchFamily="2" charset="2"/>
-              <a:buChar char="ü"/>
-            </a:pPr>
-            <a:r>
-              <a:rPr lang="ru-RU" sz="2400" dirty="0" smtClean="0"/>
-              <a:t>Добавлены подсказки</a:t>
-            </a:r>
-          </a:p>
-          <a:p>
-            <a:pPr marL="342900" indent="-342900" algn="just">
-              <a:buFont typeface="Wingdings" panose="05000000000000000000" pitchFamily="2" charset="2"/>
-              <a:buChar char="ü"/>
-            </a:pPr>
-            <a:r>
-              <a:rPr lang="ru-RU" sz="2400" dirty="0" smtClean="0"/>
-              <a:t>Добавлены новые уровни</a:t>
-            </a:r>
-          </a:p>
-          <a:p>
-            <a:pPr marL="342900" indent="-342900" algn="just">
-              <a:buFont typeface="Wingdings" panose="05000000000000000000" pitchFamily="2" charset="2"/>
-              <a:buChar char="ü"/>
-            </a:pPr>
-            <a:r>
-              <a:rPr lang="ru-RU" sz="2400" dirty="0" smtClean="0"/>
-              <a:t>Добавлены </a:t>
-            </a:r>
-            <a:r>
-              <a:rPr lang="ru-RU" sz="2400" dirty="0" err="1" smtClean="0"/>
-              <a:t>пасхалки</a:t>
-            </a:r>
-            <a:endParaRPr lang="ru-RU" sz="2400" dirty="0" smtClean="0"/>
-          </a:p>
-          <a:p>
-            <a:pPr marL="342900" indent="-342900" algn="just">
-              <a:buFont typeface="Wingdings" panose="05000000000000000000" pitchFamily="2" charset="2"/>
-              <a:buChar char="ü"/>
-            </a:pPr>
-            <a:r>
-              <a:rPr lang="ru-RU" sz="2400" dirty="0" smtClean="0"/>
-              <a:t>Новое оформление карты</a:t>
-            </a:r>
-          </a:p>
-          <a:p>
-            <a:pPr algn="just"/>
-            <a:endParaRPr lang="ru-RU" sz="2400" dirty="0"/>
-          </a:p>
-          <a:p>
-            <a:pPr algn="just"/>
-            <a:r>
-              <a:rPr lang="ru-RU" sz="2400" dirty="0" smtClean="0"/>
-              <a:t>Игра стала более лёгкой и удобной в </a:t>
-            </a:r>
-            <a:r>
-              <a:rPr lang="en-US" sz="2400" dirty="0" smtClean="0"/>
-              <a:t>gaming’</a:t>
-            </a:r>
-            <a:r>
-              <a:rPr lang="ru-RU" sz="2400" dirty="0"/>
-              <a:t>е</a:t>
-            </a:r>
-            <a:r>
-              <a:rPr lang="ru-RU" sz="2400" dirty="0" smtClean="0"/>
-              <a:t>.</a:t>
-            </a:r>
-          </a:p>
-          <a:p>
-            <a:pPr algn="just"/>
-            <a:r>
-              <a:rPr lang="ru-RU" sz="2400" dirty="0" smtClean="0"/>
-              <a:t>Среднее время прохождение игры – 1 час 15 минут.</a:t>
-            </a:r>
-          </a:p>
-        </p:txBody>
-      </p:sp>
-      <p:pic>
-        <p:nvPicPr>
-          <p:cNvPr id="5" name="Picture 2" descr="ÐÐ°ÑÑÐ¸Ð½ÐºÐ¸ Ð¿Ð¾ Ð·Ð°Ð¿ÑÐ¾ÑÑ ÐºÐ°ÑÑÐ¸Ð½ÐºÐ° Ð½Ð°Ð·Ð°Ð´ Ð² Ð±ÑÐ´ÑÑÐµÐµ">
-            <a:hlinkClick r:id="rId2" action="ppaction://hlinksldjump"/>
-          </p:cNvPr>
-          <p:cNvPicPr>
-            <a:picLocks noChangeAspect="1" noChangeArrowheads="1"/>
-          </p:cNvPicPr>
-          <p:nvPr/>
-        </p:nvPicPr>
-        <p:blipFill>
-          <a:blip r:embed="rId3" cstate="print">
-            <a:extLst>
-              <a:ext uri="{28A0092B-C50C-407E-A947-70E740481C1C}">
-                <a14:useLocalDpi xmlns:a14="http://schemas.microsoft.com/office/drawing/2010/main" val="0"/>
-              </a:ext>
-            </a:extLst>
-          </a:blip>
-          <a:srcRect/>
-          <a:stretch>
-            <a:fillRect/>
-          </a:stretch>
-        </p:blipFill>
-        <p:spPr bwMode="auto">
-          <a:xfrm>
-            <a:off x="7851775" y="2352248"/>
-            <a:ext cx="1177925" cy="1766888"/>
-          </a:xfrm>
-          <a:prstGeom prst="rect">
-            <a:avLst/>
-          </a:prstGeom>
-          <a:noFill/>
-          <a:extLst>
-            <a:ext uri="{909E8E84-426E-40DD-AFC4-6F175D3DCCD1}">
-              <a14:hiddenFill xmlns:a14="http://schemas.microsoft.com/office/drawing/2010/main">
-                <a:solidFill>
-                  <a:srgbClr val="FFFFFF"/>
-                </a:solidFill>
-              </a14:hiddenFill>
-            </a:ext>
-          </a:extLst>
         </p:spPr>
       </p:pic>
     </p:spTree>
     <p:extLst>
       <p:ext uri="{BB962C8B-B14F-4D97-AF65-F5344CB8AC3E}">
-        <p14:creationId xmlns:p14="http://schemas.microsoft.com/office/powerpoint/2010/main" val="772394645"/>
+        <p14:creationId xmlns:p14="http://schemas.microsoft.com/office/powerpoint/2010/main" val="3734268914"/>
       </p:ext>
     </p:extLst>
   </p:cSld>
   <p:clrMapOvr>
     <a:masterClrMapping/>
   </p:clrMapOvr>
-  <p:transition>
-    <p:fade/>
-  </p:transition>
-  <p:timing>
-    <p:tnLst>
-      <p:par>
-        <p:cTn id="1" dur="indefinite" restart="never" nodeType="tmRoot"/>
-      </p:par>
-    </p:tnLst>
-  </p:timing>
 </p:sld>
 </file>
 
@@ -6660,11 +8180,17 @@
             <p:ph type="title"/>
           </p:nvPr>
         </p:nvSpPr>
-        <p:spPr/>
+        <p:spPr>
+          <a:xfrm>
+            <a:off x="401472" y="0"/>
+            <a:ext cx="8357864" cy="1337732"/>
+          </a:xfrm>
+        </p:spPr>
         <p:txBody>
           <a:bodyPr/>
           <a:lstStyle/>
           <a:p>
+            <a:pPr algn="just"/>
             <a:r>
               <a:rPr lang="ru-RU" dirty="0" smtClean="0">
                 <a:solidFill>
@@ -6677,9 +8203,23 @@
                     </a:srgbClr>
                   </a:outerShdw>
                 </a:effectLst>
-                <a:cs typeface="Times New Roman" pitchFamily="18" charset="0"/>
               </a:rPr>
-              <a:t>В разработке</a:t>
+              <a:t>Выбор персонажа. </a:t>
+            </a:r>
+            <a:r>
+              <a:rPr lang="en-US" dirty="0">
+                <a:solidFill>
+                  <a:srgbClr val="FF9900"/>
+                </a:solidFill>
+                <a:effectLst>
+                  <a:outerShdw blurRad="38100" dist="38100" dir="2700000" algn="tl">
+                    <a:srgbClr val="000000">
+                      <a:alpha val="43137"/>
+                    </a:srgbClr>
+                  </a:outerShdw>
+                </a:effectLst>
+              </a:rPr>
+              <a:t>ChooseCharacter.py</a:t>
             </a:r>
             <a:endParaRPr lang="ru-RU" dirty="0">
               <a:solidFill>
@@ -6692,125 +8232,370 @@
                   </a:srgbClr>
                 </a:outerShdw>
               </a:effectLst>
-              <a:cs typeface="Times New Roman" pitchFamily="18" charset="0"/>
             </a:endParaRPr>
           </a:p>
         </p:txBody>
       </p:sp>
       <p:sp>
         <p:nvSpPr>
-          <p:cNvPr id="56" name="TextBox 55"/>
-          <p:cNvSpPr txBox="1"/>
-          <p:nvPr/>
-        </p:nvSpPr>
-        <p:spPr>
-          <a:xfrm>
-            <a:off x="635000" y="1346200"/>
-            <a:ext cx="6956426" cy="1200329"/>
-          </a:xfrm>
-          <a:prstGeom prst="rect">
-            <a:avLst/>
-          </a:prstGeom>
-          <a:noFill/>
-        </p:spPr>
-        <p:txBody>
-          <a:bodyPr wrap="square" rtlCol="0">
-            <a:spAutoFit/>
-          </a:bodyPr>
+          <p:cNvPr id="3" name="Объект 2"/>
+          <p:cNvSpPr>
+            <a:spLocks noGrp="1"/>
+          </p:cNvSpPr>
+          <p:nvPr>
+            <p:ph idx="1"/>
+          </p:nvPr>
+        </p:nvSpPr>
+        <p:spPr/>
+        <p:txBody>
+          <a:bodyPr/>
           <a:lstStyle/>
           <a:p>
-            <a:pPr marL="342900" indent="-342900">
-              <a:buFont typeface="Wingdings" panose="05000000000000000000" pitchFamily="2" charset="2"/>
-              <a:buChar char="v"/>
+            <a:pPr marL="0" indent="0" algn="just">
+              <a:buNone/>
             </a:pPr>
             <a:r>
-              <a:rPr lang="ru-RU" sz="2400" dirty="0" smtClean="0"/>
-              <a:t>Новые уровни</a:t>
-            </a:r>
-          </a:p>
-          <a:p>
-            <a:pPr marL="342900" indent="-342900">
-              <a:buFont typeface="Wingdings" panose="05000000000000000000" pitchFamily="2" charset="2"/>
-              <a:buChar char="v"/>
+              <a:rPr lang="ru-RU" dirty="0" smtClean="0"/>
+              <a:t>Выбор персонажа осуществлен отдельным классом </a:t>
+            </a:r>
+            <a:r>
+              <a:rPr lang="en-US" dirty="0" smtClean="0"/>
+              <a:t>(</a:t>
+            </a:r>
+            <a:r>
+              <a:rPr lang="en-US" dirty="0" err="1" smtClean="0"/>
+              <a:t>ChooseCharacter</a:t>
+            </a:r>
+            <a:r>
+              <a:rPr lang="en-US" dirty="0" smtClean="0"/>
+              <a:t>) </a:t>
+            </a:r>
+            <a:r>
+              <a:rPr lang="ru-RU" dirty="0" smtClean="0"/>
+              <a:t>в файле </a:t>
+            </a:r>
+            <a:r>
+              <a:rPr lang="en-US" dirty="0" smtClean="0"/>
+              <a:t>ChooseCharacter.py.</a:t>
+            </a:r>
+          </a:p>
+          <a:p>
+            <a:pPr marL="0" indent="0" algn="just">
+              <a:buNone/>
             </a:pPr>
             <a:r>
-              <a:rPr lang="ru-RU" sz="2400" dirty="0" smtClean="0"/>
-              <a:t>Новые </a:t>
-            </a:r>
-            <a:r>
-              <a:rPr lang="ru-RU" sz="2400" dirty="0" err="1" smtClean="0"/>
-              <a:t>пасхалки</a:t>
-            </a:r>
-            <a:endParaRPr lang="ru-RU" sz="2400" dirty="0" smtClean="0"/>
-          </a:p>
-          <a:p>
-            <a:pPr marL="342900" indent="-342900">
-              <a:buFont typeface="Wingdings" panose="05000000000000000000" pitchFamily="2" charset="2"/>
-              <a:buChar char="v"/>
-            </a:pPr>
-            <a:r>
-              <a:rPr lang="ru-RU" sz="2400" dirty="0" smtClean="0"/>
-              <a:t>Решение некоторых багов</a:t>
-            </a:r>
-          </a:p>
-        </p:txBody>
-      </p:sp>
-      <p:pic>
-        <p:nvPicPr>
-          <p:cNvPr id="5" name="Picture 2" descr="ÐÐ°ÑÑÐ¸Ð½ÐºÐ¸ Ð¿Ð¾ Ð·Ð°Ð¿ÑÐ¾ÑÑ ÐºÐ°ÑÑÐ¸Ð½ÐºÐ° Ð½Ð°Ð·Ð°Ð´ Ð² Ð±ÑÐ´ÑÑÐµÐµ">
-            <a:hlinkClick r:id="rId2" action="ppaction://hlinksldjump"/>
-          </p:cNvPr>
-          <p:cNvPicPr>
-            <a:picLocks noChangeAspect="1" noChangeArrowheads="1"/>
-          </p:cNvPicPr>
-          <p:nvPr/>
-        </p:nvPicPr>
-        <p:blipFill>
-          <a:blip r:embed="rId3" cstate="print">
-            <a:extLst>
-              <a:ext uri="{28A0092B-C50C-407E-A947-70E740481C1C}">
-                <a14:useLocalDpi xmlns:a14="http://schemas.microsoft.com/office/drawing/2010/main" val="0"/>
-              </a:ext>
-            </a:extLst>
-          </a:blip>
-          <a:srcRect/>
-          <a:stretch>
-            <a:fillRect/>
-          </a:stretch>
-        </p:blipFill>
-        <p:spPr bwMode="auto">
-          <a:xfrm>
-            <a:off x="7851775" y="2352248"/>
-            <a:ext cx="1177925" cy="1766888"/>
-          </a:xfrm>
-          <a:prstGeom prst="rect">
-            <a:avLst/>
-          </a:prstGeom>
-          <a:noFill/>
-          <a:extLst>
-            <a:ext uri="{909E8E84-426E-40DD-AFC4-6F175D3DCCD1}">
-              <a14:hiddenFill xmlns:a14="http://schemas.microsoft.com/office/drawing/2010/main">
-                <a:solidFill>
-                  <a:srgbClr val="FFFFFF"/>
-                </a:solidFill>
-              </a14:hiddenFill>
-            </a:ext>
-          </a:extLst>
-        </p:spPr>
-      </p:pic>
+              <a:rPr lang="ru-RU" dirty="0" smtClean="0"/>
+              <a:t>Даёт возможность игроку выбрать одного из 6 возможных персонажей.</a:t>
+            </a:r>
+            <a:endParaRPr lang="ru-RU" dirty="0"/>
+          </a:p>
+        </p:txBody>
+      </p:sp>
     </p:spTree>
     <p:extLst>
       <p:ext uri="{BB962C8B-B14F-4D97-AF65-F5344CB8AC3E}">
-        <p14:creationId xmlns:p14="http://schemas.microsoft.com/office/powerpoint/2010/main" val="3313767354"/>
+        <p14:creationId xmlns:p14="http://schemas.microsoft.com/office/powerpoint/2010/main" val="3938624697"/>
       </p:ext>
     </p:extLst>
   </p:cSld>
   <p:clrMapOvr>
     <a:masterClrMapping/>
   </p:clrMapOvr>
-  <p:transition>
-    <p:fade/>
-  </p:transition>
+  <p:timing>
+    <p:tnLst>
+      <p:par>
+        <p:cTn id="1" dur="indefinite" restart="never" nodeType="tmRoot"/>
+      </p:par>
+    </p:tnLst>
+  </p:timing>
+</p:sld>
+</file>
+
+<file path=ppt/slides/slide8.xml><?xml version="1.0" encoding="utf-8"?>
+<p:sld xmlns:a="http://schemas.openxmlformats.org/drawingml/2006/main" xmlns:r="http://schemas.openxmlformats.org/officeDocument/2006/relationships" xmlns:p="http://schemas.openxmlformats.org/presentationml/2006/main">
+  <p:cSld>
+    <p:spTree>
+      <p:nvGrpSpPr>
+        <p:cNvPr id="1" name=""/>
+        <p:cNvGrpSpPr/>
+        <p:nvPr/>
+      </p:nvGrpSpPr>
+      <p:grpSpPr>
+        <a:xfrm>
+          <a:off x="0" y="0"/>
+          <a:ext cx="0" cy="0"/>
+          <a:chOff x="0" y="0"/>
+          <a:chExt cx="0" cy="0"/>
+        </a:xfrm>
+      </p:grpSpPr>
+      <p:sp>
+        <p:nvSpPr>
+          <p:cNvPr id="2" name="Заголовок 1"/>
+          <p:cNvSpPr>
+            <a:spLocks noGrp="1"/>
+          </p:cNvSpPr>
+          <p:nvPr>
+            <p:ph type="title"/>
+          </p:nvPr>
+        </p:nvSpPr>
+        <p:spPr/>
+        <p:txBody>
+          <a:bodyPr/>
+          <a:lstStyle/>
+          <a:p>
+            <a:r>
+              <a:rPr lang="ru-RU" dirty="0" smtClean="0">
+                <a:solidFill>
+                  <a:srgbClr val="FF9900"/>
+                </a:solidFill>
+                <a:effectLst>
+                  <a:outerShdw blurRad="38100" dist="38100" dir="2700000" algn="tl">
+                    <a:srgbClr val="000000">
+                      <a:alpha val="43137"/>
+                    </a:srgbClr>
+                  </a:outerShdw>
+                </a:effectLst>
+              </a:rPr>
+              <a:t>Окно выбора персонажей</a:t>
+            </a:r>
+            <a:endParaRPr lang="ru-RU" dirty="0">
+              <a:solidFill>
+                <a:srgbClr val="FF9900"/>
+              </a:solidFill>
+              <a:effectLst>
+                <a:outerShdw blurRad="38100" dist="38100" dir="2700000" algn="tl">
+                  <a:srgbClr val="000000">
+                    <a:alpha val="43137"/>
+                  </a:srgbClr>
+                </a:outerShdw>
+              </a:effectLst>
+            </a:endParaRPr>
+          </a:p>
+        </p:txBody>
+      </p:sp>
+      <p:pic>
+        <p:nvPicPr>
+          <p:cNvPr id="4" name="Объект 3"/>
+          <p:cNvPicPr>
+            <a:picLocks noGrp="1" noChangeAspect="1"/>
+          </p:cNvPicPr>
+          <p:nvPr>
+            <p:ph idx="1"/>
+          </p:nvPr>
+        </p:nvPicPr>
+        <p:blipFill>
+          <a:blip r:embed="rId2"/>
+          <a:stretch>
+            <a:fillRect/>
+          </a:stretch>
+        </p:blipFill>
+        <p:spPr>
+          <a:xfrm>
+            <a:off x="666035" y="1465263"/>
+            <a:ext cx="7829392" cy="4711700"/>
+          </a:xfrm>
+          <a:prstGeom prst="rect">
+            <a:avLst/>
+          </a:prstGeom>
+        </p:spPr>
+      </p:pic>
+    </p:spTree>
+    <p:extLst>
+      <p:ext uri="{BB962C8B-B14F-4D97-AF65-F5344CB8AC3E}">
+        <p14:creationId xmlns:p14="http://schemas.microsoft.com/office/powerpoint/2010/main" val="2518207395"/>
+      </p:ext>
+    </p:extLst>
+  </p:cSld>
+  <p:clrMapOvr>
+    <a:masterClrMapping/>
+  </p:clrMapOvr>
+  <p:timing>
+    <p:tnLst>
+      <p:par>
+        <p:cTn id="1" dur="indefinite" restart="never" nodeType="tmRoot"/>
+      </p:par>
+    </p:tnLst>
+  </p:timing>
+</p:sld>
+</file>
+
+<file path=ppt/slides/slide9.xml><?xml version="1.0" encoding="utf-8"?>
+<p:sld xmlns:a="http://schemas.openxmlformats.org/drawingml/2006/main" xmlns:r="http://schemas.openxmlformats.org/officeDocument/2006/relationships" xmlns:p="http://schemas.openxmlformats.org/presentationml/2006/main">
+  <p:cSld>
+    <p:spTree>
+      <p:nvGrpSpPr>
+        <p:cNvPr id="1" name=""/>
+        <p:cNvGrpSpPr/>
+        <p:nvPr/>
+      </p:nvGrpSpPr>
+      <p:grpSpPr>
+        <a:xfrm>
+          <a:off x="0" y="0"/>
+          <a:ext cx="0" cy="0"/>
+          <a:chOff x="0" y="0"/>
+          <a:chExt cx="0" cy="0"/>
+        </a:xfrm>
+      </p:grpSpPr>
+      <p:sp>
+        <p:nvSpPr>
+          <p:cNvPr id="2" name="Заголовок 1"/>
+          <p:cNvSpPr>
+            <a:spLocks noGrp="1"/>
+          </p:cNvSpPr>
+          <p:nvPr>
+            <p:ph type="title"/>
+          </p:nvPr>
+        </p:nvSpPr>
+        <p:spPr/>
+        <p:txBody>
+          <a:bodyPr/>
+          <a:lstStyle/>
+          <a:p>
+            <a:r>
+              <a:rPr lang="ru-RU" dirty="0" smtClean="0">
+                <a:solidFill>
+                  <a:srgbClr val="FF9900"/>
+                </a:solidFill>
+                <a:effectLst>
+                  <a:outerShdw blurRad="38100" dist="38100" dir="2700000" algn="tl">
+                    <a:srgbClr val="000000">
+                      <a:alpha val="43137"/>
+                    </a:srgbClr>
+                  </a:outerShdw>
+                </a:effectLst>
+              </a:rPr>
+              <a:t>Диалоги. </a:t>
+            </a:r>
+            <a:r>
+              <a:rPr lang="en-US" dirty="0">
+                <a:solidFill>
+                  <a:srgbClr val="FF9900"/>
+                </a:solidFill>
+                <a:effectLst>
+                  <a:outerShdw blurRad="38100" dist="38100" dir="2700000" algn="tl">
+                    <a:srgbClr val="000000">
+                      <a:alpha val="43137"/>
+                    </a:srgbClr>
+                  </a:outerShdw>
+                </a:effectLst>
+              </a:rPr>
+              <a:t>Dialogue.py</a:t>
+            </a:r>
+            <a:endParaRPr lang="ru-RU" dirty="0">
+              <a:solidFill>
+                <a:srgbClr val="FF9900"/>
+              </a:solidFill>
+              <a:effectLst>
+                <a:outerShdw blurRad="38100" dist="38100" dir="2700000" algn="tl">
+                  <a:srgbClr val="000000">
+                    <a:alpha val="43137"/>
+                  </a:srgbClr>
+                </a:outerShdw>
+              </a:effectLst>
+            </a:endParaRPr>
+          </a:p>
+        </p:txBody>
+      </p:sp>
+      <p:sp>
+        <p:nvSpPr>
+          <p:cNvPr id="3" name="Объект 2"/>
+          <p:cNvSpPr>
+            <a:spLocks noGrp="1"/>
+          </p:cNvSpPr>
+          <p:nvPr>
+            <p:ph idx="1"/>
+          </p:nvPr>
+        </p:nvSpPr>
+        <p:spPr/>
+        <p:txBody>
+          <a:bodyPr/>
+          <a:lstStyle/>
+          <a:p>
+            <a:pPr marL="0" indent="0">
+              <a:buNone/>
+            </a:pPr>
+            <a:r>
+              <a:rPr lang="ru-RU" dirty="0" smtClean="0"/>
+              <a:t>Диалоги в игре осуществлены благодаря файлу </a:t>
+            </a:r>
+            <a:r>
+              <a:rPr lang="en-US" dirty="0" smtClean="0"/>
+              <a:t>Dialogue.py</a:t>
+            </a:r>
+            <a:endParaRPr lang="ru-RU" dirty="0" smtClean="0"/>
+          </a:p>
+          <a:p>
+            <a:pPr marL="0" indent="0">
+              <a:buNone/>
+            </a:pPr>
+            <a:r>
+              <a:rPr lang="ru-RU" dirty="0" smtClean="0"/>
+              <a:t>Шрифт - </a:t>
+            </a:r>
+            <a:r>
+              <a:rPr lang="en-US" dirty="0" smtClean="0">
+                <a:latin typeface="Comic Sans MS" panose="030F0702030302020204" pitchFamily="66" charset="0"/>
+              </a:rPr>
+              <a:t>comic.ttf</a:t>
+            </a:r>
+          </a:p>
+          <a:p>
+            <a:pPr marL="0" indent="0">
+              <a:buNone/>
+            </a:pPr>
+            <a:r>
+              <a:rPr lang="ru-RU" dirty="0" smtClean="0"/>
+              <a:t>Пример</a:t>
+            </a:r>
+            <a:r>
+              <a:rPr lang="en-US" dirty="0" smtClean="0"/>
+              <a:t>:</a:t>
+            </a:r>
+          </a:p>
+          <a:p>
+            <a:pPr marL="0" indent="0">
+              <a:buNone/>
+            </a:pPr>
+            <a:endParaRPr lang="ru-RU" dirty="0">
+              <a:latin typeface="Comic Sans MS" panose="030F0702030302020204" pitchFamily="66" charset="0"/>
+            </a:endParaRPr>
+          </a:p>
+        </p:txBody>
+      </p:sp>
+      <p:pic>
+        <p:nvPicPr>
+          <p:cNvPr id="5" name="Объект 3"/>
+          <p:cNvPicPr>
+            <a:picLocks noChangeAspect="1"/>
+          </p:cNvPicPr>
+          <p:nvPr/>
+        </p:nvPicPr>
+        <p:blipFill>
+          <a:blip r:embed="rId2"/>
+          <a:stretch>
+            <a:fillRect/>
+          </a:stretch>
+        </p:blipFill>
+        <p:spPr>
+          <a:xfrm>
+            <a:off x="2749074" y="3592366"/>
+            <a:ext cx="3354168" cy="2584597"/>
+          </a:xfrm>
+          <a:prstGeom prst="rect">
+            <a:avLst/>
+          </a:prstGeom>
+        </p:spPr>
+      </p:pic>
+    </p:spTree>
+    <p:extLst>
+      <p:ext uri="{BB962C8B-B14F-4D97-AF65-F5344CB8AC3E}">
+        <p14:creationId xmlns:p14="http://schemas.microsoft.com/office/powerpoint/2010/main" val="754147080"/>
+      </p:ext>
+    </p:extLst>
+  </p:cSld>
+  <p:clrMapOvr>
+    <a:masterClrMapping/>
+  </p:clrMapOvr>
   <p:timing>
     <p:tnLst>
       <p:par>

</xml_diff>